<commit_message>
Ajout de la notions de rôles
</commit_message>
<xml_diff>
--- a/documentation/docTravail/seancesTravail/Déroulement d’une attaque sur un système.pptx
+++ b/documentation/docTravail/seancesTravail/Déroulement d’une attaque sur un système.pptx
@@ -7,12 +7,14 @@
   <p:sldIdLst>
     <p:sldId id="256" r:id="rId2"/>
     <p:sldId id="257" r:id="rId3"/>
-    <p:sldId id="258" r:id="rId4"/>
-    <p:sldId id="259" r:id="rId5"/>
-    <p:sldId id="260" r:id="rId6"/>
-    <p:sldId id="261" r:id="rId7"/>
-    <p:sldId id="262" r:id="rId8"/>
-    <p:sldId id="263" r:id="rId9"/>
+    <p:sldId id="265" r:id="rId4"/>
+    <p:sldId id="264" r:id="rId5"/>
+    <p:sldId id="258" r:id="rId6"/>
+    <p:sldId id="259" r:id="rId7"/>
+    <p:sldId id="260" r:id="rId8"/>
+    <p:sldId id="261" r:id="rId9"/>
+    <p:sldId id="262" r:id="rId10"/>
+    <p:sldId id="263" r:id="rId11"/>
   </p:sldIdLst>
   <p:sldSz cx="9144000" cy="6858000" type="screen4x3"/>
   <p:notesSz cx="6858000" cy="9144000"/>
@@ -295,7 +297,7 @@
           <a:p>
             <a:fld id="{F3B9D6BA-5416-495D-A565-B0C7BDE4C83D}" type="datetimeFigureOut">
               <a:rPr lang="fr-FR" smtClean="0"/>
-              <a:t>09/11/2015</a:t>
+              <a:t>13/11/2015</a:t>
             </a:fld>
             <a:endParaRPr lang="fr-FR"/>
           </a:p>
@@ -465,7 +467,7 @@
           <a:p>
             <a:fld id="{F3B9D6BA-5416-495D-A565-B0C7BDE4C83D}" type="datetimeFigureOut">
               <a:rPr lang="fr-FR" smtClean="0"/>
-              <a:t>09/11/2015</a:t>
+              <a:t>13/11/2015</a:t>
             </a:fld>
             <a:endParaRPr lang="fr-FR"/>
           </a:p>
@@ -645,7 +647,7 @@
           <a:p>
             <a:fld id="{F3B9D6BA-5416-495D-A565-B0C7BDE4C83D}" type="datetimeFigureOut">
               <a:rPr lang="fr-FR" smtClean="0"/>
-              <a:t>09/11/2015</a:t>
+              <a:t>13/11/2015</a:t>
             </a:fld>
             <a:endParaRPr lang="fr-FR"/>
           </a:p>
@@ -815,7 +817,7 @@
           <a:p>
             <a:fld id="{F3B9D6BA-5416-495D-A565-B0C7BDE4C83D}" type="datetimeFigureOut">
               <a:rPr lang="fr-FR" smtClean="0"/>
-              <a:t>09/11/2015</a:t>
+              <a:t>13/11/2015</a:t>
             </a:fld>
             <a:endParaRPr lang="fr-FR"/>
           </a:p>
@@ -1061,7 +1063,7 @@
           <a:p>
             <a:fld id="{F3B9D6BA-5416-495D-A565-B0C7BDE4C83D}" type="datetimeFigureOut">
               <a:rPr lang="fr-FR" smtClean="0"/>
-              <a:t>09/11/2015</a:t>
+              <a:t>13/11/2015</a:t>
             </a:fld>
             <a:endParaRPr lang="fr-FR"/>
           </a:p>
@@ -1349,7 +1351,7 @@
           <a:p>
             <a:fld id="{F3B9D6BA-5416-495D-A565-B0C7BDE4C83D}" type="datetimeFigureOut">
               <a:rPr lang="fr-FR" smtClean="0"/>
-              <a:t>09/11/2015</a:t>
+              <a:t>13/11/2015</a:t>
             </a:fld>
             <a:endParaRPr lang="fr-FR"/>
           </a:p>
@@ -1771,7 +1773,7 @@
           <a:p>
             <a:fld id="{F3B9D6BA-5416-495D-A565-B0C7BDE4C83D}" type="datetimeFigureOut">
               <a:rPr lang="fr-FR" smtClean="0"/>
-              <a:t>09/11/2015</a:t>
+              <a:t>13/11/2015</a:t>
             </a:fld>
             <a:endParaRPr lang="fr-FR"/>
           </a:p>
@@ -1889,7 +1891,7 @@
           <a:p>
             <a:fld id="{F3B9D6BA-5416-495D-A565-B0C7BDE4C83D}" type="datetimeFigureOut">
               <a:rPr lang="fr-FR" smtClean="0"/>
-              <a:t>09/11/2015</a:t>
+              <a:t>13/11/2015</a:t>
             </a:fld>
             <a:endParaRPr lang="fr-FR"/>
           </a:p>
@@ -1984,7 +1986,7 @@
           <a:p>
             <a:fld id="{F3B9D6BA-5416-495D-A565-B0C7BDE4C83D}" type="datetimeFigureOut">
               <a:rPr lang="fr-FR" smtClean="0"/>
-              <a:t>09/11/2015</a:t>
+              <a:t>13/11/2015</a:t>
             </a:fld>
             <a:endParaRPr lang="fr-FR"/>
           </a:p>
@@ -2261,7 +2263,7 @@
           <a:p>
             <a:fld id="{F3B9D6BA-5416-495D-A565-B0C7BDE4C83D}" type="datetimeFigureOut">
               <a:rPr lang="fr-FR" smtClean="0"/>
-              <a:t>09/11/2015</a:t>
+              <a:t>13/11/2015</a:t>
             </a:fld>
             <a:endParaRPr lang="fr-FR"/>
           </a:p>
@@ -2514,7 +2516,7 @@
           <a:p>
             <a:fld id="{F3B9D6BA-5416-495D-A565-B0C7BDE4C83D}" type="datetimeFigureOut">
               <a:rPr lang="fr-FR" smtClean="0"/>
-              <a:t>09/11/2015</a:t>
+              <a:t>13/11/2015</a:t>
             </a:fld>
             <a:endParaRPr lang="fr-FR"/>
           </a:p>
@@ -2727,7 +2729,7 @@
           <a:p>
             <a:fld id="{F3B9D6BA-5416-495D-A565-B0C7BDE4C83D}" type="datetimeFigureOut">
               <a:rPr lang="fr-FR" smtClean="0"/>
-              <a:t>09/11/2015</a:t>
+              <a:t>13/11/2015</a:t>
             </a:fld>
             <a:endParaRPr lang="fr-FR"/>
           </a:p>
@@ -4665,6 +4667,544 @@
 </p:sld>
 </file>
 
+<file path=ppt/slides/slide10.xml><?xml version="1.0" encoding="utf-8"?>
+<p:sld xmlns:a="http://schemas.openxmlformats.org/drawingml/2006/main" xmlns:r="http://schemas.openxmlformats.org/officeDocument/2006/relationships" xmlns:p="http://schemas.openxmlformats.org/presentationml/2006/main">
+  <p:cSld>
+    <p:spTree>
+      <p:nvGrpSpPr>
+        <p:cNvPr id="1" name=""/>
+        <p:cNvGrpSpPr/>
+        <p:nvPr/>
+      </p:nvGrpSpPr>
+      <p:grpSpPr>
+        <a:xfrm>
+          <a:off x="0" y="0"/>
+          <a:ext cx="0" cy="0"/>
+          <a:chOff x="0" y="0"/>
+          <a:chExt cx="0" cy="0"/>
+        </a:xfrm>
+      </p:grpSpPr>
+      <p:grpSp>
+        <p:nvGrpSpPr>
+          <p:cNvPr id="8" name="Groupe 7"/>
+          <p:cNvGrpSpPr/>
+          <p:nvPr/>
+        </p:nvGrpSpPr>
+        <p:grpSpPr>
+          <a:xfrm>
+            <a:off x="245907" y="146826"/>
+            <a:ext cx="3528392" cy="1440160"/>
+            <a:chOff x="539552" y="260648"/>
+            <a:chExt cx="3528392" cy="1440160"/>
+          </a:xfrm>
+        </p:grpSpPr>
+        <p:sp>
+          <p:nvSpPr>
+            <p:cNvPr id="7" name="Rectangle 6"/>
+            <p:cNvSpPr/>
+            <p:nvPr/>
+          </p:nvSpPr>
+          <p:spPr>
+            <a:xfrm>
+              <a:off x="539552" y="260648"/>
+              <a:ext cx="3528392" cy="1440160"/>
+            </a:xfrm>
+            <a:prstGeom prst="rect">
+              <a:avLst/>
+            </a:prstGeom>
+          </p:spPr>
+          <p:style>
+            <a:lnRef idx="2">
+              <a:schemeClr val="accent1">
+                <a:shade val="50000"/>
+              </a:schemeClr>
+            </a:lnRef>
+            <a:fillRef idx="1">
+              <a:schemeClr val="accent1"/>
+            </a:fillRef>
+            <a:effectRef idx="0">
+              <a:schemeClr val="accent1"/>
+            </a:effectRef>
+            <a:fontRef idx="minor">
+              <a:schemeClr val="lt1"/>
+            </a:fontRef>
+          </p:style>
+          <p:txBody>
+            <a:bodyPr rtlCol="0" anchor="t" anchorCtr="0"/>
+            <a:lstStyle/>
+            <a:p>
+              <a:r>
+                <a:rPr lang="fr-FR" b="1" dirty="0" err="1" smtClean="0"/>
+                <a:t>Pimca</a:t>
+              </a:r>
+              <a:endParaRPr lang="fr-FR" b="1" dirty="0"/>
+            </a:p>
+          </p:txBody>
+        </p:sp>
+        <p:sp>
+          <p:nvSpPr>
+            <p:cNvPr id="2" name="ZoneTexte 1"/>
+            <p:cNvSpPr txBox="1"/>
+            <p:nvPr/>
+          </p:nvSpPr>
+          <p:spPr>
+            <a:xfrm>
+              <a:off x="821971" y="717466"/>
+              <a:ext cx="3096344" cy="369332"/>
+            </a:xfrm>
+            <a:prstGeom prst="rect">
+              <a:avLst/>
+            </a:prstGeom>
+            <a:noFill/>
+          </p:spPr>
+          <p:txBody>
+            <a:bodyPr wrap="square" rtlCol="0">
+              <a:spAutoFit/>
+            </a:bodyPr>
+            <a:lstStyle/>
+            <a:p>
+              <a:r>
+                <a:rPr lang="fr-FR" dirty="0" smtClean="0"/>
+                <a:t>Modèle2 du système supposé</a:t>
+              </a:r>
+              <a:endParaRPr lang="fr-FR" dirty="0"/>
+            </a:p>
+          </p:txBody>
+        </p:sp>
+      </p:grpSp>
+      <p:grpSp>
+        <p:nvGrpSpPr>
+          <p:cNvPr id="9" name="Groupe 8"/>
+          <p:cNvGrpSpPr/>
+          <p:nvPr/>
+        </p:nvGrpSpPr>
+        <p:grpSpPr>
+          <a:xfrm>
+            <a:off x="4986265" y="146826"/>
+            <a:ext cx="3992251" cy="1440160"/>
+            <a:chOff x="4842250" y="260648"/>
+            <a:chExt cx="3992251" cy="1440160"/>
+          </a:xfrm>
+        </p:grpSpPr>
+        <p:sp>
+          <p:nvSpPr>
+            <p:cNvPr id="40" name="Rectangle 39"/>
+            <p:cNvSpPr/>
+            <p:nvPr/>
+          </p:nvSpPr>
+          <p:spPr>
+            <a:xfrm>
+              <a:off x="4842250" y="260648"/>
+              <a:ext cx="3992251" cy="1440160"/>
+            </a:xfrm>
+            <a:prstGeom prst="rect">
+              <a:avLst/>
+            </a:prstGeom>
+          </p:spPr>
+          <p:style>
+            <a:lnRef idx="2">
+              <a:schemeClr val="accent1">
+                <a:shade val="50000"/>
+              </a:schemeClr>
+            </a:lnRef>
+            <a:fillRef idx="1">
+              <a:schemeClr val="accent1"/>
+            </a:fillRef>
+            <a:effectRef idx="0">
+              <a:schemeClr val="accent1"/>
+            </a:effectRef>
+            <a:fontRef idx="minor">
+              <a:schemeClr val="lt1"/>
+            </a:fontRef>
+          </p:style>
+          <p:txBody>
+            <a:bodyPr rtlCol="0" anchor="t" anchorCtr="0"/>
+            <a:lstStyle/>
+            <a:p>
+              <a:r>
+                <a:rPr lang="fr-FR" b="1" dirty="0" smtClean="0"/>
+                <a:t>Excel</a:t>
+              </a:r>
+              <a:endParaRPr lang="fr-FR" b="1" dirty="0"/>
+            </a:p>
+          </p:txBody>
+        </p:sp>
+        <p:sp>
+          <p:nvSpPr>
+            <p:cNvPr id="3" name="ZoneTexte 2"/>
+            <p:cNvSpPr txBox="1"/>
+            <p:nvPr/>
+          </p:nvSpPr>
+          <p:spPr>
+            <a:xfrm>
+              <a:off x="4986265" y="683404"/>
+              <a:ext cx="3704219" cy="369332"/>
+            </a:xfrm>
+            <a:prstGeom prst="rect">
+              <a:avLst/>
+            </a:prstGeom>
+            <a:noFill/>
+          </p:spPr>
+          <p:txBody>
+            <a:bodyPr wrap="none" rtlCol="0">
+              <a:spAutoFit/>
+            </a:bodyPr>
+            <a:lstStyle/>
+            <a:p>
+              <a:r>
+                <a:rPr lang="fr-FR" dirty="0" smtClean="0"/>
+                <a:t>Consommation du système = 10kW/h</a:t>
+              </a:r>
+              <a:endParaRPr lang="fr-FR" dirty="0"/>
+            </a:p>
+          </p:txBody>
+        </p:sp>
+      </p:grpSp>
+      <p:sp>
+        <p:nvSpPr>
+          <p:cNvPr id="10" name="Ellipse 9"/>
+          <p:cNvSpPr/>
+          <p:nvPr/>
+        </p:nvSpPr>
+        <p:spPr>
+          <a:xfrm>
+            <a:off x="2699792" y="2132856"/>
+            <a:ext cx="3397763" cy="1853722"/>
+          </a:xfrm>
+          <a:prstGeom prst="ellipse">
+            <a:avLst/>
+          </a:prstGeom>
+        </p:spPr>
+        <p:style>
+          <a:lnRef idx="2">
+            <a:schemeClr val="accent3">
+              <a:shade val="50000"/>
+            </a:schemeClr>
+          </a:lnRef>
+          <a:fillRef idx="1">
+            <a:schemeClr val="accent3"/>
+          </a:fillRef>
+          <a:effectRef idx="0">
+            <a:schemeClr val="accent3"/>
+          </a:effectRef>
+          <a:fontRef idx="minor">
+            <a:schemeClr val="lt1"/>
+          </a:fontRef>
+        </p:style>
+        <p:txBody>
+          <a:bodyPr rtlCol="0" anchor="ctr" anchorCtr="0"/>
+          <a:lstStyle/>
+          <a:p>
+            <a:pPr algn="ctr"/>
+            <a:r>
+              <a:rPr lang="fr-FR" b="1" dirty="0" smtClean="0"/>
+              <a:t>Role4All</a:t>
+            </a:r>
+            <a:endParaRPr lang="fr-FR" b="1" dirty="0"/>
+          </a:p>
+        </p:txBody>
+      </p:sp>
+      <p:cxnSp>
+        <p:nvCxnSpPr>
+          <p:cNvPr id="15" name="Connecteur droit avec flèche 14"/>
+          <p:cNvCxnSpPr>
+            <a:stCxn id="40" idx="2"/>
+            <a:endCxn id="10" idx="7"/>
+          </p:cNvCxnSpPr>
+          <p:nvPr/>
+        </p:nvCxnSpPr>
+        <p:spPr>
+          <a:xfrm flipH="1">
+            <a:off x="5599964" y="1586986"/>
+            <a:ext cx="1382427" cy="817341"/>
+          </a:xfrm>
+          <a:prstGeom prst="straightConnector1">
+            <a:avLst/>
+          </a:prstGeom>
+          <a:ln>
+            <a:tailEnd type="arrow"/>
+          </a:ln>
+        </p:spPr>
+        <p:style>
+          <a:lnRef idx="2">
+            <a:schemeClr val="accent1"/>
+          </a:lnRef>
+          <a:fillRef idx="0">
+            <a:schemeClr val="accent1"/>
+          </a:fillRef>
+          <a:effectRef idx="1">
+            <a:schemeClr val="accent1"/>
+          </a:effectRef>
+          <a:fontRef idx="minor">
+            <a:schemeClr val="tx1"/>
+          </a:fontRef>
+        </p:style>
+      </p:cxnSp>
+      <p:cxnSp>
+        <p:nvCxnSpPr>
+          <p:cNvPr id="27" name="Connecteur droit avec flèche 26"/>
+          <p:cNvCxnSpPr>
+            <a:stCxn id="7" idx="2"/>
+            <a:endCxn id="10" idx="1"/>
+          </p:cNvCxnSpPr>
+          <p:nvPr/>
+        </p:nvCxnSpPr>
+        <p:spPr>
+          <a:xfrm>
+            <a:off x="2010103" y="1586986"/>
+            <a:ext cx="1187280" cy="817341"/>
+          </a:xfrm>
+          <a:prstGeom prst="straightConnector1">
+            <a:avLst/>
+          </a:prstGeom>
+          <a:ln>
+            <a:tailEnd type="arrow"/>
+          </a:ln>
+        </p:spPr>
+        <p:style>
+          <a:lnRef idx="2">
+            <a:schemeClr val="accent1"/>
+          </a:lnRef>
+          <a:fillRef idx="0">
+            <a:schemeClr val="accent1"/>
+          </a:fillRef>
+          <a:effectRef idx="1">
+            <a:schemeClr val="accent1"/>
+          </a:effectRef>
+          <a:fontRef idx="minor">
+            <a:schemeClr val="tx1"/>
+          </a:fontRef>
+        </p:style>
+      </p:cxnSp>
+      <p:sp>
+        <p:nvSpPr>
+          <p:cNvPr id="33" name="Rectangle à coins arrondis 32"/>
+          <p:cNvSpPr/>
+          <p:nvPr/>
+        </p:nvSpPr>
+        <p:spPr>
+          <a:xfrm>
+            <a:off x="74958" y="4581128"/>
+            <a:ext cx="3168352" cy="1728192"/>
+          </a:xfrm>
+          <a:prstGeom prst="roundRect">
+            <a:avLst/>
+          </a:prstGeom>
+        </p:spPr>
+        <p:style>
+          <a:lnRef idx="2">
+            <a:schemeClr val="accent2">
+              <a:shade val="50000"/>
+            </a:schemeClr>
+          </a:lnRef>
+          <a:fillRef idx="1">
+            <a:schemeClr val="accent2"/>
+          </a:fillRef>
+          <a:effectRef idx="0">
+            <a:schemeClr val="accent2"/>
+          </a:effectRef>
+          <a:fontRef idx="minor">
+            <a:schemeClr val="lt1"/>
+          </a:fontRef>
+        </p:style>
+        <p:txBody>
+          <a:bodyPr rtlCol="0" anchor="t" anchorCtr="0"/>
+          <a:lstStyle/>
+          <a:p>
+            <a:r>
+              <a:rPr lang="fr-FR" b="1" dirty="0" err="1" smtClean="0"/>
+              <a:t>Morphose</a:t>
+            </a:r>
+            <a:endParaRPr lang="fr-FR" b="1" dirty="0"/>
+          </a:p>
+        </p:txBody>
+      </p:sp>
+      <p:cxnSp>
+        <p:nvCxnSpPr>
+          <p:cNvPr id="37" name="Connecteur droit avec flèche 36"/>
+          <p:cNvCxnSpPr>
+            <a:stCxn id="10" idx="4"/>
+            <a:endCxn id="33" idx="0"/>
+          </p:cNvCxnSpPr>
+          <p:nvPr/>
+        </p:nvCxnSpPr>
+        <p:spPr>
+          <a:xfrm flipH="1">
+            <a:off x="1659134" y="3986578"/>
+            <a:ext cx="2739540" cy="594550"/>
+          </a:xfrm>
+          <a:prstGeom prst="straightConnector1">
+            <a:avLst/>
+          </a:prstGeom>
+          <a:ln>
+            <a:tailEnd type="arrow"/>
+          </a:ln>
+        </p:spPr>
+        <p:style>
+          <a:lnRef idx="3">
+            <a:schemeClr val="accent3"/>
+          </a:lnRef>
+          <a:fillRef idx="0">
+            <a:schemeClr val="accent3"/>
+          </a:fillRef>
+          <a:effectRef idx="2">
+            <a:schemeClr val="accent3"/>
+          </a:effectRef>
+          <a:fontRef idx="minor">
+            <a:schemeClr val="tx1"/>
+          </a:fontRef>
+        </p:style>
+      </p:cxnSp>
+      <p:sp>
+        <p:nvSpPr>
+          <p:cNvPr id="67" name="ZoneTexte 66"/>
+          <p:cNvSpPr txBox="1"/>
+          <p:nvPr/>
+        </p:nvSpPr>
+        <p:spPr>
+          <a:xfrm>
+            <a:off x="171451" y="5301208"/>
+            <a:ext cx="2975366" cy="646331"/>
+          </a:xfrm>
+          <a:prstGeom prst="rect">
+            <a:avLst/>
+          </a:prstGeom>
+          <a:noFill/>
+        </p:spPr>
+        <p:txBody>
+          <a:bodyPr wrap="none" rtlCol="0">
+            <a:spAutoFit/>
+          </a:bodyPr>
+          <a:lstStyle/>
+          <a:p>
+            <a:pPr algn="ctr"/>
+            <a:r>
+              <a:rPr lang="fr-FR" dirty="0" smtClean="0"/>
+              <a:t>Modèle2 du système supposé</a:t>
+            </a:r>
+          </a:p>
+          <a:p>
+            <a:pPr algn="ctr"/>
+            <a:r>
+              <a:rPr lang="fr-FR" dirty="0" smtClean="0"/>
+              <a:t> consommant 10kW/h</a:t>
+            </a:r>
+            <a:endParaRPr lang="fr-FR" dirty="0"/>
+          </a:p>
+        </p:txBody>
+      </p:sp>
+      <p:cxnSp>
+        <p:nvCxnSpPr>
+          <p:cNvPr id="57" name="Connecteur droit avec flèche 56"/>
+          <p:cNvCxnSpPr>
+            <a:stCxn id="33" idx="3"/>
+          </p:cNvCxnSpPr>
+          <p:nvPr/>
+        </p:nvCxnSpPr>
+        <p:spPr>
+          <a:xfrm>
+            <a:off x="3243310" y="5445224"/>
+            <a:ext cx="752626" cy="0"/>
+          </a:xfrm>
+          <a:prstGeom prst="straightConnector1">
+            <a:avLst/>
+          </a:prstGeom>
+          <a:ln>
+            <a:tailEnd type="arrow"/>
+          </a:ln>
+        </p:spPr>
+        <p:style>
+          <a:lnRef idx="3">
+            <a:schemeClr val="dk1"/>
+          </a:lnRef>
+          <a:fillRef idx="0">
+            <a:schemeClr val="dk1"/>
+          </a:fillRef>
+          <a:effectRef idx="2">
+            <a:schemeClr val="dk1"/>
+          </a:effectRef>
+          <a:fontRef idx="minor">
+            <a:schemeClr val="tx1"/>
+          </a:fontRef>
+        </p:style>
+      </p:cxnSp>
+      <p:sp>
+        <p:nvSpPr>
+          <p:cNvPr id="58" name="ZoneTexte 57"/>
+          <p:cNvSpPr txBox="1"/>
+          <p:nvPr/>
+        </p:nvSpPr>
+        <p:spPr>
+          <a:xfrm>
+            <a:off x="4198175" y="4978042"/>
+            <a:ext cx="4539383" cy="923330"/>
+          </a:xfrm>
+          <a:prstGeom prst="rect">
+            <a:avLst/>
+          </a:prstGeom>
+          <a:noFill/>
+        </p:spPr>
+        <p:txBody>
+          <a:bodyPr wrap="none" rtlCol="0">
+            <a:spAutoFit/>
+          </a:bodyPr>
+          <a:lstStyle/>
+          <a:p>
+            <a:pPr algn="ctr"/>
+            <a:r>
+              <a:rPr lang="fr-FR" b="1" dirty="0" err="1" smtClean="0"/>
+              <a:t>Succés</a:t>
+            </a:r>
+            <a:r>
+              <a:rPr lang="fr-FR" b="1" dirty="0" smtClean="0"/>
+              <a:t>:</a:t>
+            </a:r>
+            <a:r>
+              <a:rPr lang="fr-FR" dirty="0" smtClean="0"/>
+              <a:t> </a:t>
+            </a:r>
+          </a:p>
+          <a:p>
+            <a:pPr algn="ctr"/>
+            <a:r>
+              <a:rPr lang="fr-FR" dirty="0"/>
+              <a:t>C</a:t>
+            </a:r>
+            <a:r>
+              <a:rPr lang="fr-FR" dirty="0" smtClean="0"/>
+              <a:t>onsommation du système supposé = 10kW/h</a:t>
+            </a:r>
+          </a:p>
+          <a:p>
+            <a:pPr algn="ctr"/>
+            <a:r>
+              <a:rPr lang="fr-FR" dirty="0" smtClean="0"/>
+              <a:t>Consommation du système réel = 10kW/h</a:t>
+            </a:r>
+            <a:endParaRPr lang="fr-FR" dirty="0"/>
+          </a:p>
+        </p:txBody>
+      </p:sp>
+    </p:spTree>
+    <p:extLst>
+      <p:ext uri="{BB962C8B-B14F-4D97-AF65-F5344CB8AC3E}">
+        <p14:creationId xmlns:p14="http://schemas.microsoft.com/office/powerpoint/2010/main" val="1645594382"/>
+      </p:ext>
+    </p:extLst>
+  </p:cSld>
+  <p:clrMapOvr>
+    <a:masterClrMapping/>
+  </p:clrMapOvr>
+  <p:timing>
+    <p:tnLst>
+      <p:par>
+        <p:cTn id="1" dur="indefinite" restart="never" nodeType="tmRoot"/>
+      </p:par>
+    </p:tnLst>
+  </p:timing>
+</p:sld>
+</file>
+
 <file path=ppt/slides/slide2.xml><?xml version="1.0" encoding="utf-8"?>
 <p:sld xmlns:a="http://schemas.openxmlformats.org/drawingml/2006/main" xmlns:r="http://schemas.openxmlformats.org/officeDocument/2006/relationships" xmlns:p="http://schemas.openxmlformats.org/presentationml/2006/main">
   <p:cSld>
@@ -4849,10 +5389,10 @@
         </p:nvGrpSpPr>
         <p:grpSpPr>
           <a:xfrm>
-            <a:off x="1989967" y="885195"/>
-            <a:ext cx="1102352" cy="1406774"/>
-            <a:chOff x="777888" y="2175534"/>
-            <a:chExt cx="1102352" cy="1406774"/>
+            <a:off x="1980672" y="885195"/>
+            <a:ext cx="1142749" cy="1406774"/>
+            <a:chOff x="768593" y="2175534"/>
+            <a:chExt cx="1142749" cy="1406774"/>
           </a:xfrm>
         </p:grpSpPr>
         <p:pic>
@@ -4893,8 +5433,8 @@
           </p:nvSpPr>
           <p:spPr>
             <a:xfrm>
-              <a:off x="931663" y="3212976"/>
-              <a:ext cx="700833" cy="369332"/>
+              <a:off x="768593" y="3212976"/>
+              <a:ext cx="1142749" cy="369332"/>
             </a:xfrm>
             <a:prstGeom prst="rect">
               <a:avLst/>
@@ -4908,8 +5448,12 @@
             <a:lstStyle/>
             <a:p>
               <a:r>
+                <a:rPr lang="fr-FR" b="1" dirty="0"/>
+                <a:t>Elément </a:t>
+              </a:r>
+              <a:r>
                 <a:rPr lang="fr-FR" b="1" dirty="0" smtClean="0"/>
-                <a:t>FPGA</a:t>
+                <a:t>2</a:t>
               </a:r>
               <a:endParaRPr lang="fr-FR" b="1" dirty="0"/>
             </a:p>
@@ -4924,10 +5468,10 @@
         </p:nvGrpSpPr>
         <p:grpSpPr>
           <a:xfrm>
-            <a:off x="5845912" y="2276872"/>
-            <a:ext cx="1102352" cy="1406774"/>
-            <a:chOff x="777888" y="2175534"/>
-            <a:chExt cx="1102352" cy="1406774"/>
+            <a:off x="5805515" y="2276872"/>
+            <a:ext cx="1142749" cy="1400000"/>
+            <a:chOff x="737491" y="2175534"/>
+            <a:chExt cx="1142749" cy="1400000"/>
           </a:xfrm>
         </p:grpSpPr>
         <p:pic>
@@ -4968,8 +5512,8 @@
           </p:nvSpPr>
           <p:spPr>
             <a:xfrm>
-              <a:off x="1054790" y="3212976"/>
-              <a:ext cx="622286" cy="369332"/>
+              <a:off x="737491" y="3206202"/>
+              <a:ext cx="1142749" cy="369332"/>
             </a:xfrm>
             <a:prstGeom prst="rect">
               <a:avLst/>
@@ -4983,8 +5527,12 @@
             <a:lstStyle/>
             <a:p>
               <a:r>
+                <a:rPr lang="fr-FR" b="1" dirty="0"/>
+                <a:t>Elément </a:t>
+              </a:r>
+              <a:r>
                 <a:rPr lang="fr-FR" b="1" dirty="0" smtClean="0"/>
-                <a:t>HDD</a:t>
+                <a:t>4</a:t>
               </a:r>
               <a:endParaRPr lang="fr-FR" b="1" dirty="0"/>
             </a:p>
@@ -4999,10 +5547,10 @@
         </p:nvGrpSpPr>
         <p:grpSpPr>
           <a:xfrm>
-            <a:off x="5867177" y="918495"/>
-            <a:ext cx="1102352" cy="1406774"/>
-            <a:chOff x="777888" y="2175534"/>
-            <a:chExt cx="1102352" cy="1406774"/>
+            <a:off x="5805514" y="918495"/>
+            <a:ext cx="1164015" cy="1434250"/>
+            <a:chOff x="716225" y="2175534"/>
+            <a:chExt cx="1164015" cy="1434250"/>
           </a:xfrm>
         </p:grpSpPr>
         <p:pic>
@@ -5043,8 +5591,8 @@
           </p:nvSpPr>
           <p:spPr>
             <a:xfrm>
-              <a:off x="1157600" y="3212976"/>
-              <a:ext cx="362600" cy="369332"/>
+              <a:off x="716225" y="3240452"/>
+              <a:ext cx="1142749" cy="369332"/>
             </a:xfrm>
             <a:prstGeom prst="rect">
               <a:avLst/>
@@ -5058,8 +5606,12 @@
             <a:lstStyle/>
             <a:p>
               <a:r>
+                <a:rPr lang="fr-FR" b="1" dirty="0"/>
+                <a:t>Elément </a:t>
+              </a:r>
+              <a:r>
                 <a:rPr lang="fr-FR" b="1" dirty="0" smtClean="0"/>
-                <a:t>I7</a:t>
+                <a:t>3</a:t>
               </a:r>
               <a:endParaRPr lang="fr-FR" b="1" dirty="0"/>
             </a:p>
@@ -5074,8 +5626,8 @@
         </p:nvGrpSpPr>
         <p:grpSpPr>
           <a:xfrm>
-            <a:off x="1796713" y="2886369"/>
-            <a:ext cx="1440160" cy="671121"/>
+            <a:off x="1796712" y="2886369"/>
+            <a:ext cx="1954943" cy="671121"/>
             <a:chOff x="1631432" y="4654721"/>
             <a:chExt cx="1440160" cy="671121"/>
           </a:xfrm>
@@ -5126,7 +5678,7 @@
                     <a:schemeClr val="tx1"/>
                   </a:solidFill>
                 </a:rPr>
-                <a:t>Camera</a:t>
+                <a:t>Elément 1</a:t>
               </a:r>
               <a:endParaRPr lang="fr-FR" b="1" dirty="0">
                 <a:solidFill>
@@ -5317,8 +5869,8 @@
         </p:nvCxnSpPr>
         <p:spPr>
           <a:xfrm>
-            <a:off x="2494159" y="2291969"/>
-            <a:ext cx="22634" cy="594400"/>
+            <a:off x="2552047" y="2291969"/>
+            <a:ext cx="222137" cy="594400"/>
           </a:xfrm>
           <a:prstGeom prst="straightConnector1">
             <a:avLst/>
@@ -5465,7 +6017,7 @@
         <p:spPr>
           <a:xfrm flipH="1">
             <a:off x="1109430" y="3221930"/>
-            <a:ext cx="687283" cy="582"/>
+            <a:ext cx="687282" cy="582"/>
           </a:xfrm>
           <a:prstGeom prst="straightConnector1">
             <a:avLst/>
@@ -5656,10 +6208,10 @@
         </p:nvGrpSpPr>
         <p:grpSpPr>
           <a:xfrm>
-            <a:off x="5845912" y="3678410"/>
-            <a:ext cx="1102352" cy="1406774"/>
-            <a:chOff x="777888" y="2175534"/>
-            <a:chExt cx="1102352" cy="1406774"/>
+            <a:off x="5805515" y="3678410"/>
+            <a:ext cx="1142749" cy="1406774"/>
+            <a:chOff x="737491" y="2175534"/>
+            <a:chExt cx="1142749" cy="1406774"/>
           </a:xfrm>
         </p:grpSpPr>
         <p:pic>
@@ -5700,8 +6252,8 @@
           </p:nvSpPr>
           <p:spPr>
             <a:xfrm>
-              <a:off x="1001089" y="3212976"/>
-              <a:ext cx="655949" cy="369332"/>
+              <a:off x="737491" y="3212976"/>
+              <a:ext cx="1142749" cy="369332"/>
             </a:xfrm>
             <a:prstGeom prst="rect">
               <a:avLst/>
@@ -5715,8 +6267,12 @@
             <a:lstStyle/>
             <a:p>
               <a:r>
+                <a:rPr lang="fr-FR" b="1" dirty="0"/>
+                <a:t>Elément </a:t>
+              </a:r>
+              <a:r>
                 <a:rPr lang="fr-FR" b="1" dirty="0" smtClean="0"/>
-                <a:t>RAM</a:t>
+                <a:t>5</a:t>
               </a:r>
               <a:endParaRPr lang="fr-FR" b="1" dirty="0"/>
             </a:p>
@@ -5767,10 +6323,10 @@
         </p:nvGrpSpPr>
         <p:grpSpPr>
           <a:xfrm>
-            <a:off x="5850624" y="5190578"/>
-            <a:ext cx="1102352" cy="1406774"/>
-            <a:chOff x="777888" y="2175534"/>
-            <a:chExt cx="1102352" cy="1406774"/>
+            <a:off x="5825712" y="5190578"/>
+            <a:ext cx="1142749" cy="1406774"/>
+            <a:chOff x="752976" y="2175534"/>
+            <a:chExt cx="1142749" cy="1406774"/>
           </a:xfrm>
         </p:grpSpPr>
         <p:pic>
@@ -5811,8 +6367,8 @@
           </p:nvSpPr>
           <p:spPr>
             <a:xfrm>
-              <a:off x="996377" y="3212976"/>
-              <a:ext cx="606256" cy="369332"/>
+              <a:off x="752976" y="3212976"/>
+              <a:ext cx="1142749" cy="369332"/>
             </a:xfrm>
             <a:prstGeom prst="rect">
               <a:avLst/>
@@ -5826,8 +6382,12 @@
             <a:lstStyle/>
             <a:p>
               <a:r>
+                <a:rPr lang="fr-FR" b="1" dirty="0"/>
+                <a:t>Elément </a:t>
+              </a:r>
+              <a:r>
                 <a:rPr lang="fr-FR" b="1" dirty="0" smtClean="0"/>
-                <a:t>GPU</a:t>
+                <a:t>6</a:t>
               </a:r>
               <a:endParaRPr lang="fr-FR" b="1" dirty="0"/>
             </a:p>
@@ -5891,6 +6451,1626 @@
 </file>
 
 <file path=ppt/slides/slide3.xml><?xml version="1.0" encoding="utf-8"?>
+<p:sld xmlns:a="http://schemas.openxmlformats.org/drawingml/2006/main" xmlns:r="http://schemas.openxmlformats.org/officeDocument/2006/relationships" xmlns:p="http://schemas.openxmlformats.org/presentationml/2006/main">
+  <p:cSld>
+    <p:spTree>
+      <p:nvGrpSpPr>
+        <p:cNvPr id="1" name=""/>
+        <p:cNvGrpSpPr/>
+        <p:nvPr/>
+      </p:nvGrpSpPr>
+      <p:grpSpPr>
+        <a:xfrm>
+          <a:off x="0" y="0"/>
+          <a:ext cx="0" cy="0"/>
+          <a:chOff x="0" y="0"/>
+          <a:chExt cx="0" cy="0"/>
+        </a:xfrm>
+      </p:grpSpPr>
+      <p:sp>
+        <p:nvSpPr>
+          <p:cNvPr id="42" name="Rectangle 41"/>
+          <p:cNvSpPr/>
+          <p:nvPr/>
+        </p:nvSpPr>
+        <p:spPr>
+          <a:xfrm>
+            <a:off x="245907" y="146826"/>
+            <a:ext cx="3528392" cy="1440160"/>
+          </a:xfrm>
+          <a:prstGeom prst="rect">
+            <a:avLst/>
+          </a:prstGeom>
+        </p:spPr>
+        <p:style>
+          <a:lnRef idx="2">
+            <a:schemeClr val="accent1">
+              <a:shade val="50000"/>
+            </a:schemeClr>
+          </a:lnRef>
+          <a:fillRef idx="1">
+            <a:schemeClr val="accent1"/>
+          </a:fillRef>
+          <a:effectRef idx="0">
+            <a:schemeClr val="accent1"/>
+          </a:effectRef>
+          <a:fontRef idx="minor">
+            <a:schemeClr val="lt1"/>
+          </a:fontRef>
+        </p:style>
+        <p:txBody>
+          <a:bodyPr rtlCol="0" anchor="t" anchorCtr="0"/>
+          <a:lstStyle/>
+          <a:p>
+            <a:r>
+              <a:rPr lang="fr-FR" b="1" dirty="0" err="1" smtClean="0"/>
+              <a:t>Pimca</a:t>
+            </a:r>
+            <a:endParaRPr lang="fr-FR" b="1" dirty="0"/>
+          </a:p>
+        </p:txBody>
+      </p:sp>
+      <p:sp>
+        <p:nvSpPr>
+          <p:cNvPr id="47" name="Rectangle 46"/>
+          <p:cNvSpPr/>
+          <p:nvPr/>
+        </p:nvSpPr>
+        <p:spPr>
+          <a:xfrm>
+            <a:off x="4986265" y="146826"/>
+            <a:ext cx="3992251" cy="1440160"/>
+          </a:xfrm>
+          <a:prstGeom prst="rect">
+            <a:avLst/>
+          </a:prstGeom>
+        </p:spPr>
+        <p:style>
+          <a:lnRef idx="2">
+            <a:schemeClr val="accent1">
+              <a:shade val="50000"/>
+            </a:schemeClr>
+          </a:lnRef>
+          <a:fillRef idx="1">
+            <a:schemeClr val="accent1"/>
+          </a:fillRef>
+          <a:effectRef idx="0">
+            <a:schemeClr val="accent1"/>
+          </a:effectRef>
+          <a:fontRef idx="minor">
+            <a:schemeClr val="lt1"/>
+          </a:fontRef>
+        </p:style>
+        <p:txBody>
+          <a:bodyPr rtlCol="0" anchor="t" anchorCtr="0"/>
+          <a:lstStyle/>
+          <a:p>
+            <a:r>
+              <a:rPr lang="fr-FR" b="1" dirty="0" err="1" smtClean="0"/>
+              <a:t>Morphose</a:t>
+            </a:r>
+            <a:endParaRPr lang="fr-FR" b="1" dirty="0"/>
+          </a:p>
+        </p:txBody>
+      </p:sp>
+      <p:sp>
+        <p:nvSpPr>
+          <p:cNvPr id="62" name="Ellipse 61"/>
+          <p:cNvSpPr/>
+          <p:nvPr/>
+        </p:nvSpPr>
+        <p:spPr>
+          <a:xfrm>
+            <a:off x="1362147" y="2182234"/>
+            <a:ext cx="6306198" cy="3190981"/>
+          </a:xfrm>
+          <a:prstGeom prst="ellipse">
+            <a:avLst/>
+          </a:prstGeom>
+        </p:spPr>
+        <p:style>
+          <a:lnRef idx="2">
+            <a:schemeClr val="accent3">
+              <a:shade val="50000"/>
+            </a:schemeClr>
+          </a:lnRef>
+          <a:fillRef idx="1">
+            <a:schemeClr val="accent3"/>
+          </a:fillRef>
+          <a:effectRef idx="0">
+            <a:schemeClr val="accent3"/>
+          </a:effectRef>
+          <a:fontRef idx="minor">
+            <a:schemeClr val="lt1"/>
+          </a:fontRef>
+        </p:style>
+        <p:txBody>
+          <a:bodyPr rtlCol="0" anchor="t" anchorCtr="0"/>
+          <a:lstStyle/>
+          <a:p>
+            <a:pPr algn="ctr"/>
+            <a:r>
+              <a:rPr lang="fr-FR" b="1" dirty="0" smtClean="0"/>
+              <a:t>Role4All</a:t>
+            </a:r>
+            <a:endParaRPr lang="fr-FR" b="1" dirty="0"/>
+          </a:p>
+        </p:txBody>
+      </p:sp>
+      <p:sp>
+        <p:nvSpPr>
+          <p:cNvPr id="11" name="ZoneTexte 10"/>
+          <p:cNvSpPr txBox="1"/>
+          <p:nvPr/>
+        </p:nvSpPr>
+        <p:spPr>
+          <a:xfrm>
+            <a:off x="1444339" y="682240"/>
+            <a:ext cx="1131528" cy="369332"/>
+          </a:xfrm>
+          <a:prstGeom prst="rect">
+            <a:avLst/>
+          </a:prstGeom>
+          <a:noFill/>
+        </p:spPr>
+        <p:txBody>
+          <a:bodyPr wrap="none" rtlCol="0">
+            <a:spAutoFit/>
+          </a:bodyPr>
+          <a:lstStyle/>
+          <a:p>
+            <a:r>
+              <a:rPr lang="fr-FR" dirty="0" smtClean="0"/>
+              <a:t>Elément 1</a:t>
+            </a:r>
+            <a:endParaRPr lang="fr-FR" dirty="0"/>
+          </a:p>
+        </p:txBody>
+      </p:sp>
+      <p:sp>
+        <p:nvSpPr>
+          <p:cNvPr id="25" name="Rectangle 24"/>
+          <p:cNvSpPr/>
+          <p:nvPr/>
+        </p:nvSpPr>
+        <p:spPr>
+          <a:xfrm>
+            <a:off x="3651758" y="3777724"/>
+            <a:ext cx="1728192" cy="492155"/>
+          </a:xfrm>
+          <a:prstGeom prst="rect">
+            <a:avLst/>
+          </a:prstGeom>
+        </p:spPr>
+        <p:style>
+          <a:lnRef idx="1">
+            <a:schemeClr val="accent3"/>
+          </a:lnRef>
+          <a:fillRef idx="2">
+            <a:schemeClr val="accent3"/>
+          </a:fillRef>
+          <a:effectRef idx="1">
+            <a:schemeClr val="accent3"/>
+          </a:effectRef>
+          <a:fontRef idx="minor">
+            <a:schemeClr val="dk1"/>
+          </a:fontRef>
+        </p:style>
+        <p:txBody>
+          <a:bodyPr rtlCol="0" anchor="ctr"/>
+          <a:lstStyle/>
+          <a:p>
+            <a:pPr algn="ctr"/>
+            <a:r>
+              <a:rPr lang="fr-FR" dirty="0" smtClean="0"/>
+              <a:t>Camera</a:t>
+            </a:r>
+            <a:endParaRPr lang="fr-FR" dirty="0"/>
+          </a:p>
+        </p:txBody>
+      </p:sp>
+      <p:sp>
+        <p:nvSpPr>
+          <p:cNvPr id="27" name="ZoneTexte 26"/>
+          <p:cNvSpPr txBox="1"/>
+          <p:nvPr/>
+        </p:nvSpPr>
+        <p:spPr>
+          <a:xfrm>
+            <a:off x="5769969" y="476672"/>
+            <a:ext cx="2747355" cy="923330"/>
+          </a:xfrm>
+          <a:prstGeom prst="rect">
+            <a:avLst/>
+          </a:prstGeom>
+          <a:noFill/>
+        </p:spPr>
+        <p:txBody>
+          <a:bodyPr wrap="none" rtlCol="0">
+            <a:spAutoFit/>
+          </a:bodyPr>
+          <a:lstStyle/>
+          <a:p>
+            <a:pPr marL="285750" indent="-285750">
+              <a:buFontTx/>
+              <a:buChar char="-"/>
+            </a:pPr>
+            <a:r>
+              <a:rPr lang="fr-FR" dirty="0" smtClean="0"/>
+              <a:t>Consommation : 30 mW</a:t>
+            </a:r>
+          </a:p>
+          <a:p>
+            <a:pPr marL="285750" indent="-285750">
+              <a:buFontTx/>
+              <a:buChar char="-"/>
+            </a:pPr>
+            <a:r>
+              <a:rPr lang="fr-FR" dirty="0" smtClean="0"/>
+              <a:t>Température : 20°C</a:t>
+            </a:r>
+          </a:p>
+          <a:p>
+            <a:pPr marL="285750" indent="-285750">
+              <a:buFontTx/>
+              <a:buChar char="-"/>
+            </a:pPr>
+            <a:r>
+              <a:rPr lang="fr-FR" dirty="0" smtClean="0"/>
+              <a:t>Dimension: NC</a:t>
+            </a:r>
+            <a:endParaRPr lang="fr-FR" dirty="0"/>
+          </a:p>
+        </p:txBody>
+      </p:sp>
+      <p:cxnSp>
+        <p:nvCxnSpPr>
+          <p:cNvPr id="29" name="Connecteur droit avec flèche 28"/>
+          <p:cNvCxnSpPr>
+            <a:stCxn id="25" idx="0"/>
+            <a:endCxn id="27" idx="2"/>
+          </p:cNvCxnSpPr>
+          <p:nvPr/>
+        </p:nvCxnSpPr>
+        <p:spPr>
+          <a:xfrm flipV="1">
+            <a:off x="4515854" y="1400002"/>
+            <a:ext cx="2627793" cy="2377722"/>
+          </a:xfrm>
+          <a:prstGeom prst="straightConnector1">
+            <a:avLst/>
+          </a:prstGeom>
+          <a:ln>
+            <a:tailEnd type="arrow"/>
+          </a:ln>
+        </p:spPr>
+        <p:style>
+          <a:lnRef idx="2">
+            <a:schemeClr val="dk1"/>
+          </a:lnRef>
+          <a:fillRef idx="0">
+            <a:schemeClr val="dk1"/>
+          </a:fillRef>
+          <a:effectRef idx="1">
+            <a:schemeClr val="dk1"/>
+          </a:effectRef>
+          <a:fontRef idx="minor">
+            <a:schemeClr val="tx1"/>
+          </a:fontRef>
+        </p:style>
+      </p:cxnSp>
+      <p:cxnSp>
+        <p:nvCxnSpPr>
+          <p:cNvPr id="32" name="Connecteur droit avec flèche 31"/>
+          <p:cNvCxnSpPr>
+            <a:stCxn id="25" idx="0"/>
+            <a:endCxn id="11" idx="2"/>
+          </p:cNvCxnSpPr>
+          <p:nvPr/>
+        </p:nvCxnSpPr>
+        <p:spPr>
+          <a:xfrm flipH="1" flipV="1">
+            <a:off x="2010103" y="1051572"/>
+            <a:ext cx="2505751" cy="2726152"/>
+          </a:xfrm>
+          <a:prstGeom prst="straightConnector1">
+            <a:avLst/>
+          </a:prstGeom>
+          <a:ln>
+            <a:tailEnd type="arrow"/>
+          </a:ln>
+        </p:spPr>
+        <p:style>
+          <a:lnRef idx="2">
+            <a:schemeClr val="dk1"/>
+          </a:lnRef>
+          <a:fillRef idx="0">
+            <a:schemeClr val="dk1"/>
+          </a:fillRef>
+          <a:effectRef idx="1">
+            <a:schemeClr val="dk1"/>
+          </a:effectRef>
+          <a:fontRef idx="minor">
+            <a:schemeClr val="tx1"/>
+          </a:fontRef>
+        </p:style>
+      </p:cxnSp>
+    </p:spTree>
+    <p:extLst>
+      <p:ext uri="{BB962C8B-B14F-4D97-AF65-F5344CB8AC3E}">
+        <p14:creationId xmlns:p14="http://schemas.microsoft.com/office/powerpoint/2010/main" val="495340788"/>
+      </p:ext>
+    </p:extLst>
+  </p:cSld>
+  <p:clrMapOvr>
+    <a:masterClrMapping/>
+  </p:clrMapOvr>
+  <p:timing>
+    <p:tnLst>
+      <p:par>
+        <p:cTn id="1" dur="indefinite" restart="never" nodeType="tmRoot"/>
+      </p:par>
+    </p:tnLst>
+  </p:timing>
+</p:sld>
+</file>
+
+<file path=ppt/slides/slide4.xml><?xml version="1.0" encoding="utf-8"?>
+<p:sld xmlns:a="http://schemas.openxmlformats.org/drawingml/2006/main" xmlns:r="http://schemas.openxmlformats.org/officeDocument/2006/relationships" xmlns:p="http://schemas.openxmlformats.org/presentationml/2006/main">
+  <p:cSld>
+    <p:spTree>
+      <p:nvGrpSpPr>
+        <p:cNvPr id="1" name=""/>
+        <p:cNvGrpSpPr/>
+        <p:nvPr/>
+      </p:nvGrpSpPr>
+      <p:grpSpPr>
+        <a:xfrm>
+          <a:off x="0" y="0"/>
+          <a:ext cx="0" cy="0"/>
+          <a:chOff x="0" y="0"/>
+          <a:chExt cx="0" cy="0"/>
+        </a:xfrm>
+      </p:grpSpPr>
+      <p:sp>
+        <p:nvSpPr>
+          <p:cNvPr id="4" name="ZoneTexte 3"/>
+          <p:cNvSpPr txBox="1"/>
+          <p:nvPr/>
+        </p:nvSpPr>
+        <p:spPr>
+          <a:xfrm>
+            <a:off x="2579851" y="5715"/>
+            <a:ext cx="4438844" cy="461665"/>
+          </a:xfrm>
+          <a:prstGeom prst="rect">
+            <a:avLst/>
+          </a:prstGeom>
+          <a:noFill/>
+        </p:spPr>
+        <p:txBody>
+          <a:bodyPr wrap="none" rtlCol="0">
+            <a:spAutoFit/>
+          </a:bodyPr>
+          <a:lstStyle/>
+          <a:p>
+            <a:r>
+              <a:rPr lang="fr-FR" sz="2400" b="1" dirty="0" smtClean="0">
+                <a:solidFill>
+                  <a:schemeClr val="accent1"/>
+                </a:solidFill>
+                <a:effectLst>
+                  <a:outerShdw blurRad="38100" dist="38100" dir="2700000" algn="tl">
+                    <a:srgbClr val="000000">
+                      <a:alpha val="43137"/>
+                    </a:srgbClr>
+                  </a:outerShdw>
+                </a:effectLst>
+              </a:rPr>
+              <a:t>Système Hypothétique </a:t>
+            </a:r>
+            <a:r>
+              <a:rPr lang="fr-FR" sz="2400" b="1" dirty="0" smtClean="0">
+                <a:solidFill>
+                  <a:schemeClr val="accent1"/>
+                </a:solidFill>
+                <a:effectLst>
+                  <a:outerShdw blurRad="38100" dist="38100" dir="2700000" algn="tl">
+                    <a:srgbClr val="000000">
+                      <a:alpha val="43137"/>
+                    </a:srgbClr>
+                  </a:outerShdw>
+                </a:effectLst>
+              </a:rPr>
+              <a:t>n°1 + </a:t>
+            </a:r>
+            <a:r>
+              <a:rPr lang="fr-FR" sz="2400" b="1" dirty="0" err="1" smtClean="0">
+                <a:solidFill>
+                  <a:schemeClr val="accent1"/>
+                </a:solidFill>
+                <a:effectLst>
+                  <a:outerShdw blurRad="38100" dist="38100" dir="2700000" algn="tl">
+                    <a:srgbClr val="000000">
+                      <a:alpha val="43137"/>
+                    </a:srgbClr>
+                  </a:outerShdw>
+                </a:effectLst>
+              </a:rPr>
+              <a:t>Role</a:t>
+            </a:r>
+            <a:endParaRPr lang="fr-FR" sz="2400" b="1" dirty="0">
+              <a:solidFill>
+                <a:schemeClr val="accent1"/>
+              </a:solidFill>
+              <a:effectLst>
+                <a:outerShdw blurRad="38100" dist="38100" dir="2700000" algn="tl">
+                  <a:srgbClr val="000000">
+                    <a:alpha val="43137"/>
+                  </a:srgbClr>
+                </a:outerShdw>
+              </a:effectLst>
+            </a:endParaRPr>
+          </a:p>
+        </p:txBody>
+      </p:sp>
+      <p:grpSp>
+        <p:nvGrpSpPr>
+          <p:cNvPr id="12" name="Groupe 11"/>
+          <p:cNvGrpSpPr/>
+          <p:nvPr/>
+        </p:nvGrpSpPr>
+        <p:grpSpPr>
+          <a:xfrm>
+            <a:off x="3751656" y="1220927"/>
+            <a:ext cx="1112871" cy="450860"/>
+            <a:chOff x="-2107081" y="4628814"/>
+            <a:chExt cx="1475942" cy="450860"/>
+          </a:xfrm>
+        </p:grpSpPr>
+        <p:sp>
+          <p:nvSpPr>
+            <p:cNvPr id="13" name="Rectangle 12"/>
+            <p:cNvSpPr/>
+            <p:nvPr/>
+          </p:nvSpPr>
+          <p:spPr>
+            <a:xfrm>
+              <a:off x="-2107081" y="4694702"/>
+              <a:ext cx="1475942" cy="335067"/>
+            </a:xfrm>
+            <a:prstGeom prst="rect">
+              <a:avLst/>
+            </a:prstGeom>
+            <a:solidFill>
+              <a:srgbClr val="8FFF29"/>
+            </a:solidFill>
+            <a:ln>
+              <a:noFill/>
+            </a:ln>
+          </p:spPr>
+          <p:style>
+            <a:lnRef idx="2">
+              <a:schemeClr val="accent6">
+                <a:shade val="50000"/>
+              </a:schemeClr>
+            </a:lnRef>
+            <a:fillRef idx="1">
+              <a:schemeClr val="accent6"/>
+            </a:fillRef>
+            <a:effectRef idx="0">
+              <a:schemeClr val="accent6"/>
+            </a:effectRef>
+            <a:fontRef idx="minor">
+              <a:schemeClr val="lt1"/>
+            </a:fontRef>
+          </p:style>
+          <p:txBody>
+            <a:bodyPr rtlCol="0" anchor="ctr"/>
+            <a:lstStyle/>
+            <a:p>
+              <a:pPr algn="ctr"/>
+              <a:r>
+                <a:rPr lang="fr-FR" dirty="0" smtClean="0"/>
+                <a:t>       </a:t>
+              </a:r>
+              <a:r>
+                <a:rPr lang="fr-FR" b="1" dirty="0" smtClean="0">
+                  <a:solidFill>
+                    <a:schemeClr val="tx1"/>
+                  </a:solidFill>
+                </a:rPr>
+                <a:t>Bus</a:t>
+              </a:r>
+              <a:endParaRPr lang="fr-FR" b="1" dirty="0">
+                <a:solidFill>
+                  <a:schemeClr val="tx1"/>
+                </a:solidFill>
+              </a:endParaRPr>
+            </a:p>
+          </p:txBody>
+        </p:sp>
+        <p:pic>
+          <p:nvPicPr>
+            <p:cNvPr id="14" name="Image 13"/>
+            <p:cNvPicPr>
+              <a:picLocks noChangeAspect="1"/>
+            </p:cNvPicPr>
+            <p:nvPr/>
+          </p:nvPicPr>
+          <p:blipFill>
+            <a:blip r:embed="rId2" cstate="print">
+              <a:extLst>
+                <a:ext uri="{28A0092B-C50C-407E-A947-70E740481C1C}">
+                  <a14:useLocalDpi xmlns:a14="http://schemas.microsoft.com/office/drawing/2010/main" val="0"/>
+                </a:ext>
+              </a:extLst>
+            </a:blip>
+            <a:stretch>
+              <a:fillRect/>
+            </a:stretch>
+          </p:blipFill>
+          <p:spPr>
+            <a:xfrm>
+              <a:off x="-1978881" y="4628814"/>
+              <a:ext cx="450860" cy="450860"/>
+            </a:xfrm>
+            <a:prstGeom prst="rect">
+              <a:avLst/>
+            </a:prstGeom>
+          </p:spPr>
+        </p:pic>
+      </p:grpSp>
+      <p:grpSp>
+        <p:nvGrpSpPr>
+          <p:cNvPr id="17" name="Groupe 16"/>
+          <p:cNvGrpSpPr/>
+          <p:nvPr/>
+        </p:nvGrpSpPr>
+        <p:grpSpPr>
+          <a:xfrm>
+            <a:off x="1989967" y="885195"/>
+            <a:ext cx="1102352" cy="1406774"/>
+            <a:chOff x="777888" y="2175534"/>
+            <a:chExt cx="1102352" cy="1406774"/>
+          </a:xfrm>
+        </p:grpSpPr>
+        <p:pic>
+          <p:nvPicPr>
+            <p:cNvPr id="6" name="Image 5"/>
+            <p:cNvPicPr>
+              <a:picLocks noChangeAspect="1"/>
+            </p:cNvPicPr>
+            <p:nvPr/>
+          </p:nvPicPr>
+          <p:blipFill>
+            <a:blip r:embed="rId3">
+              <a:extLst>
+                <a:ext uri="{28A0092B-C50C-407E-A947-70E740481C1C}">
+                  <a14:useLocalDpi xmlns:a14="http://schemas.microsoft.com/office/drawing/2010/main" val="0"/>
+                </a:ext>
+              </a:extLst>
+            </a:blip>
+            <a:stretch>
+              <a:fillRect/>
+            </a:stretch>
+          </p:blipFill>
+          <p:spPr>
+            <a:xfrm>
+              <a:off x="777888" y="2175534"/>
+              <a:ext cx="1102352" cy="1102352"/>
+            </a:xfrm>
+            <a:prstGeom prst="rect">
+              <a:avLst/>
+            </a:prstGeom>
+          </p:spPr>
+        </p:pic>
+        <p:sp>
+          <p:nvSpPr>
+            <p:cNvPr id="16" name="ZoneTexte 15"/>
+            <p:cNvSpPr txBox="1"/>
+            <p:nvPr/>
+          </p:nvSpPr>
+          <p:spPr>
+            <a:xfrm>
+              <a:off x="931663" y="3212976"/>
+              <a:ext cx="700833" cy="369332"/>
+            </a:xfrm>
+            <a:prstGeom prst="rect">
+              <a:avLst/>
+            </a:prstGeom>
+            <a:noFill/>
+          </p:spPr>
+          <p:txBody>
+            <a:bodyPr wrap="none" rtlCol="0">
+              <a:spAutoFit/>
+            </a:bodyPr>
+            <a:lstStyle/>
+            <a:p>
+              <a:r>
+                <a:rPr lang="fr-FR" b="1" dirty="0" smtClean="0"/>
+                <a:t>FPGA</a:t>
+              </a:r>
+              <a:endParaRPr lang="fr-FR" b="1" dirty="0"/>
+            </a:p>
+          </p:txBody>
+        </p:sp>
+      </p:grpSp>
+      <p:grpSp>
+        <p:nvGrpSpPr>
+          <p:cNvPr id="18" name="Groupe 17"/>
+          <p:cNvGrpSpPr/>
+          <p:nvPr/>
+        </p:nvGrpSpPr>
+        <p:grpSpPr>
+          <a:xfrm>
+            <a:off x="5845912" y="2276872"/>
+            <a:ext cx="1102352" cy="1406774"/>
+            <a:chOff x="777888" y="2175534"/>
+            <a:chExt cx="1102352" cy="1406774"/>
+          </a:xfrm>
+        </p:grpSpPr>
+        <p:pic>
+          <p:nvPicPr>
+            <p:cNvPr id="19" name="Image 18"/>
+            <p:cNvPicPr>
+              <a:picLocks noChangeAspect="1"/>
+            </p:cNvPicPr>
+            <p:nvPr/>
+          </p:nvPicPr>
+          <p:blipFill>
+            <a:blip r:embed="rId3">
+              <a:extLst>
+                <a:ext uri="{28A0092B-C50C-407E-A947-70E740481C1C}">
+                  <a14:useLocalDpi xmlns:a14="http://schemas.microsoft.com/office/drawing/2010/main" val="0"/>
+                </a:ext>
+              </a:extLst>
+            </a:blip>
+            <a:stretch>
+              <a:fillRect/>
+            </a:stretch>
+          </p:blipFill>
+          <p:spPr>
+            <a:xfrm>
+              <a:off x="777888" y="2175534"/>
+              <a:ext cx="1102352" cy="1102352"/>
+            </a:xfrm>
+            <a:prstGeom prst="rect">
+              <a:avLst/>
+            </a:prstGeom>
+          </p:spPr>
+        </p:pic>
+        <p:sp>
+          <p:nvSpPr>
+            <p:cNvPr id="20" name="ZoneTexte 19"/>
+            <p:cNvSpPr txBox="1"/>
+            <p:nvPr/>
+          </p:nvSpPr>
+          <p:spPr>
+            <a:xfrm>
+              <a:off x="1054790" y="3212976"/>
+              <a:ext cx="622286" cy="369332"/>
+            </a:xfrm>
+            <a:prstGeom prst="rect">
+              <a:avLst/>
+            </a:prstGeom>
+            <a:noFill/>
+          </p:spPr>
+          <p:txBody>
+            <a:bodyPr wrap="none" rtlCol="0">
+              <a:spAutoFit/>
+            </a:bodyPr>
+            <a:lstStyle/>
+            <a:p>
+              <a:r>
+                <a:rPr lang="fr-FR" b="1" dirty="0" smtClean="0"/>
+                <a:t>HDD</a:t>
+              </a:r>
+              <a:endParaRPr lang="fr-FR" b="1" dirty="0"/>
+            </a:p>
+          </p:txBody>
+        </p:sp>
+      </p:grpSp>
+      <p:grpSp>
+        <p:nvGrpSpPr>
+          <p:cNvPr id="21" name="Groupe 20"/>
+          <p:cNvGrpSpPr/>
+          <p:nvPr/>
+        </p:nvGrpSpPr>
+        <p:grpSpPr>
+          <a:xfrm>
+            <a:off x="5867177" y="918495"/>
+            <a:ext cx="1102352" cy="1406774"/>
+            <a:chOff x="777888" y="2175534"/>
+            <a:chExt cx="1102352" cy="1406774"/>
+          </a:xfrm>
+        </p:grpSpPr>
+        <p:pic>
+          <p:nvPicPr>
+            <p:cNvPr id="22" name="Image 21"/>
+            <p:cNvPicPr>
+              <a:picLocks noChangeAspect="1"/>
+            </p:cNvPicPr>
+            <p:nvPr/>
+          </p:nvPicPr>
+          <p:blipFill>
+            <a:blip r:embed="rId3">
+              <a:extLst>
+                <a:ext uri="{28A0092B-C50C-407E-A947-70E740481C1C}">
+                  <a14:useLocalDpi xmlns:a14="http://schemas.microsoft.com/office/drawing/2010/main" val="0"/>
+                </a:ext>
+              </a:extLst>
+            </a:blip>
+            <a:stretch>
+              <a:fillRect/>
+            </a:stretch>
+          </p:blipFill>
+          <p:spPr>
+            <a:xfrm>
+              <a:off x="777888" y="2175534"/>
+              <a:ext cx="1102352" cy="1102352"/>
+            </a:xfrm>
+            <a:prstGeom prst="rect">
+              <a:avLst/>
+            </a:prstGeom>
+          </p:spPr>
+        </p:pic>
+        <p:sp>
+          <p:nvSpPr>
+            <p:cNvPr id="23" name="ZoneTexte 22"/>
+            <p:cNvSpPr txBox="1"/>
+            <p:nvPr/>
+          </p:nvSpPr>
+          <p:spPr>
+            <a:xfrm>
+              <a:off x="1157600" y="3212976"/>
+              <a:ext cx="362600" cy="369332"/>
+            </a:xfrm>
+            <a:prstGeom prst="rect">
+              <a:avLst/>
+            </a:prstGeom>
+            <a:noFill/>
+          </p:spPr>
+          <p:txBody>
+            <a:bodyPr wrap="none" rtlCol="0">
+              <a:spAutoFit/>
+            </a:bodyPr>
+            <a:lstStyle/>
+            <a:p>
+              <a:r>
+                <a:rPr lang="fr-FR" b="1" dirty="0" smtClean="0"/>
+                <a:t>I7</a:t>
+              </a:r>
+              <a:endParaRPr lang="fr-FR" b="1" dirty="0"/>
+            </a:p>
+          </p:txBody>
+        </p:sp>
+      </p:grpSp>
+      <p:grpSp>
+        <p:nvGrpSpPr>
+          <p:cNvPr id="46" name="Groupe 45"/>
+          <p:cNvGrpSpPr/>
+          <p:nvPr/>
+        </p:nvGrpSpPr>
+        <p:grpSpPr>
+          <a:xfrm>
+            <a:off x="1796713" y="2886369"/>
+            <a:ext cx="1440160" cy="671121"/>
+            <a:chOff x="1631432" y="4654721"/>
+            <a:chExt cx="1440160" cy="671121"/>
+          </a:xfrm>
+        </p:grpSpPr>
+        <p:sp>
+          <p:nvSpPr>
+            <p:cNvPr id="24" name="Ellipse 23"/>
+            <p:cNvSpPr/>
+            <p:nvPr/>
+          </p:nvSpPr>
+          <p:spPr>
+            <a:xfrm>
+              <a:off x="1631432" y="4654721"/>
+              <a:ext cx="1440160" cy="671121"/>
+            </a:xfrm>
+            <a:prstGeom prst="ellipse">
+              <a:avLst/>
+            </a:prstGeom>
+          </p:spPr>
+          <p:style>
+            <a:lnRef idx="2">
+              <a:schemeClr val="accent6">
+                <a:shade val="50000"/>
+              </a:schemeClr>
+            </a:lnRef>
+            <a:fillRef idx="1">
+              <a:schemeClr val="accent6"/>
+            </a:fillRef>
+            <a:effectRef idx="0">
+              <a:schemeClr val="accent6"/>
+            </a:effectRef>
+            <a:fontRef idx="minor">
+              <a:schemeClr val="lt1"/>
+            </a:fontRef>
+          </p:style>
+          <p:txBody>
+            <a:bodyPr rtlCol="0" anchor="ctr"/>
+            <a:lstStyle/>
+            <a:p>
+              <a:pPr algn="ctr"/>
+              <a:r>
+                <a:rPr lang="fr-FR" dirty="0" smtClean="0"/>
+                <a:t>  </a:t>
+              </a:r>
+              <a:r>
+                <a:rPr lang="fr-FR" b="1" dirty="0" smtClean="0">
+                  <a:solidFill>
+                    <a:schemeClr val="tx1"/>
+                  </a:solidFill>
+                </a:rPr>
+                <a:t>Camera</a:t>
+              </a:r>
+              <a:endParaRPr lang="fr-FR" b="1" dirty="0">
+                <a:solidFill>
+                  <a:schemeClr val="tx1"/>
+                </a:solidFill>
+              </a:endParaRPr>
+            </a:p>
+          </p:txBody>
+        </p:sp>
+        <p:cxnSp>
+          <p:nvCxnSpPr>
+            <p:cNvPr id="26" name="Connecteur droit avec flèche 25"/>
+            <p:cNvCxnSpPr/>
+            <p:nvPr/>
+          </p:nvCxnSpPr>
+          <p:spPr>
+            <a:xfrm>
+              <a:off x="1817046" y="4854108"/>
+              <a:ext cx="7640" cy="272345"/>
+            </a:xfrm>
+            <a:prstGeom prst="straightConnector1">
+              <a:avLst/>
+            </a:prstGeom>
+            <a:ln>
+              <a:headEnd type="arrow"/>
+              <a:tailEnd type="arrow"/>
+            </a:ln>
+          </p:spPr>
+          <p:style>
+            <a:lnRef idx="2">
+              <a:schemeClr val="accent1"/>
+            </a:lnRef>
+            <a:fillRef idx="0">
+              <a:schemeClr val="accent1"/>
+            </a:fillRef>
+            <a:effectRef idx="1">
+              <a:schemeClr val="accent1"/>
+            </a:effectRef>
+            <a:fontRef idx="minor">
+              <a:schemeClr val="tx1"/>
+            </a:fontRef>
+          </p:style>
+        </p:cxnSp>
+        <p:cxnSp>
+          <p:nvCxnSpPr>
+            <p:cNvPr id="30" name="Connecteur droit 29"/>
+            <p:cNvCxnSpPr/>
+            <p:nvPr/>
+          </p:nvCxnSpPr>
+          <p:spPr>
+            <a:xfrm>
+              <a:off x="1716674" y="4844702"/>
+              <a:ext cx="216024" cy="0"/>
+            </a:xfrm>
+            <a:prstGeom prst="line">
+              <a:avLst/>
+            </a:prstGeom>
+          </p:spPr>
+          <p:style>
+            <a:lnRef idx="1">
+              <a:schemeClr val="accent1"/>
+            </a:lnRef>
+            <a:fillRef idx="0">
+              <a:schemeClr val="accent1"/>
+            </a:fillRef>
+            <a:effectRef idx="0">
+              <a:schemeClr val="accent1"/>
+            </a:effectRef>
+            <a:fontRef idx="minor">
+              <a:schemeClr val="tx1"/>
+            </a:fontRef>
+          </p:style>
+        </p:cxnSp>
+        <p:cxnSp>
+          <p:nvCxnSpPr>
+            <p:cNvPr id="38" name="Connecteur droit 37"/>
+            <p:cNvCxnSpPr/>
+            <p:nvPr/>
+          </p:nvCxnSpPr>
+          <p:spPr>
+            <a:xfrm>
+              <a:off x="1716674" y="5149485"/>
+              <a:ext cx="216024" cy="0"/>
+            </a:xfrm>
+            <a:prstGeom prst="line">
+              <a:avLst/>
+            </a:prstGeom>
+          </p:spPr>
+          <p:style>
+            <a:lnRef idx="1">
+              <a:schemeClr val="accent1"/>
+            </a:lnRef>
+            <a:fillRef idx="0">
+              <a:schemeClr val="accent1"/>
+            </a:fillRef>
+            <a:effectRef idx="0">
+              <a:schemeClr val="accent1"/>
+            </a:effectRef>
+            <a:fontRef idx="minor">
+              <a:schemeClr val="tx1"/>
+            </a:fontRef>
+          </p:style>
+        </p:cxnSp>
+      </p:grpSp>
+      <p:grpSp>
+        <p:nvGrpSpPr>
+          <p:cNvPr id="45" name="Groupe 44"/>
+          <p:cNvGrpSpPr/>
+          <p:nvPr/>
+        </p:nvGrpSpPr>
+        <p:grpSpPr>
+          <a:xfrm>
+            <a:off x="200710" y="2369389"/>
+            <a:ext cx="908720" cy="1307483"/>
+            <a:chOff x="372977" y="3933380"/>
+            <a:chExt cx="908720" cy="1307483"/>
+          </a:xfrm>
+        </p:grpSpPr>
+        <p:pic>
+          <p:nvPicPr>
+            <p:cNvPr id="5" name="Image 4"/>
+            <p:cNvPicPr>
+              <a:picLocks noChangeAspect="1"/>
+            </p:cNvPicPr>
+            <p:nvPr/>
+          </p:nvPicPr>
+          <p:blipFill>
+            <a:blip r:embed="rId4" cstate="print">
+              <a:extLst>
+                <a:ext uri="{28A0092B-C50C-407E-A947-70E740481C1C}">
+                  <a14:useLocalDpi xmlns:a14="http://schemas.microsoft.com/office/drawing/2010/main" val="0"/>
+                </a:ext>
+              </a:extLst>
+            </a:blip>
+            <a:stretch>
+              <a:fillRect/>
+            </a:stretch>
+          </p:blipFill>
+          <p:spPr>
+            <a:xfrm>
+              <a:off x="372977" y="4332143"/>
+              <a:ext cx="908720" cy="908720"/>
+            </a:xfrm>
+            <a:prstGeom prst="rect">
+              <a:avLst/>
+            </a:prstGeom>
+          </p:spPr>
+        </p:pic>
+        <p:sp>
+          <p:nvSpPr>
+            <p:cNvPr id="39" name="ZoneTexte 38"/>
+            <p:cNvSpPr txBox="1"/>
+            <p:nvPr/>
+          </p:nvSpPr>
+          <p:spPr>
+            <a:xfrm>
+              <a:off x="420013" y="3933380"/>
+              <a:ext cx="814647" cy="369332"/>
+            </a:xfrm>
+            <a:prstGeom prst="rect">
+              <a:avLst/>
+            </a:prstGeom>
+            <a:noFill/>
+          </p:spPr>
+          <p:txBody>
+            <a:bodyPr wrap="none" rtlCol="0">
+              <a:spAutoFit/>
+            </a:bodyPr>
+            <a:lstStyle/>
+            <a:p>
+              <a:r>
+                <a:rPr lang="fr-FR" b="1" dirty="0" smtClean="0"/>
+                <a:t>Object</a:t>
+              </a:r>
+              <a:endParaRPr lang="fr-FR" b="1" dirty="0"/>
+            </a:p>
+          </p:txBody>
+        </p:sp>
+      </p:grpSp>
+      <p:cxnSp>
+        <p:nvCxnSpPr>
+          <p:cNvPr id="48" name="Connecteur droit avec flèche 47"/>
+          <p:cNvCxnSpPr>
+            <a:stCxn id="16" idx="2"/>
+            <a:endCxn id="24" idx="0"/>
+          </p:cNvCxnSpPr>
+          <p:nvPr/>
+        </p:nvCxnSpPr>
+        <p:spPr>
+          <a:xfrm>
+            <a:off x="2494159" y="2291969"/>
+            <a:ext cx="22634" cy="594400"/>
+          </a:xfrm>
+          <a:prstGeom prst="straightConnector1">
+            <a:avLst/>
+          </a:prstGeom>
+          <a:ln>
+            <a:headEnd type="arrow"/>
+            <a:tailEnd type="arrow"/>
+          </a:ln>
+        </p:spPr>
+        <p:style>
+          <a:lnRef idx="2">
+            <a:schemeClr val="accent1"/>
+          </a:lnRef>
+          <a:fillRef idx="0">
+            <a:schemeClr val="accent1"/>
+          </a:fillRef>
+          <a:effectRef idx="1">
+            <a:schemeClr val="accent1"/>
+          </a:effectRef>
+          <a:fontRef idx="minor">
+            <a:schemeClr val="tx1"/>
+          </a:fontRef>
+        </p:style>
+      </p:cxnSp>
+      <p:cxnSp>
+        <p:nvCxnSpPr>
+          <p:cNvPr id="49" name="Connecteur droit avec flèche 48"/>
+          <p:cNvCxnSpPr>
+            <a:stCxn id="6" idx="3"/>
+            <a:endCxn id="13" idx="1"/>
+          </p:cNvCxnSpPr>
+          <p:nvPr/>
+        </p:nvCxnSpPr>
+        <p:spPr>
+          <a:xfrm>
+            <a:off x="3092319" y="1436371"/>
+            <a:ext cx="659337" cy="17978"/>
+          </a:xfrm>
+          <a:prstGeom prst="straightConnector1">
+            <a:avLst/>
+          </a:prstGeom>
+          <a:ln>
+            <a:headEnd type="arrow"/>
+            <a:tailEnd type="arrow"/>
+          </a:ln>
+        </p:spPr>
+        <p:style>
+          <a:lnRef idx="2">
+            <a:schemeClr val="accent1"/>
+          </a:lnRef>
+          <a:fillRef idx="0">
+            <a:schemeClr val="accent1"/>
+          </a:fillRef>
+          <a:effectRef idx="1">
+            <a:schemeClr val="accent1"/>
+          </a:effectRef>
+          <a:fontRef idx="minor">
+            <a:schemeClr val="tx1"/>
+          </a:fontRef>
+        </p:style>
+      </p:cxnSp>
+      <p:cxnSp>
+        <p:nvCxnSpPr>
+          <p:cNvPr id="52" name="Connecteur droit avec flèche 51"/>
+          <p:cNvCxnSpPr>
+            <a:stCxn id="13" idx="3"/>
+            <a:endCxn id="22" idx="1"/>
+          </p:cNvCxnSpPr>
+          <p:nvPr/>
+        </p:nvCxnSpPr>
+        <p:spPr>
+          <a:xfrm>
+            <a:off x="4864527" y="1454349"/>
+            <a:ext cx="1002650" cy="15322"/>
+          </a:xfrm>
+          <a:prstGeom prst="straightConnector1">
+            <a:avLst/>
+          </a:prstGeom>
+          <a:ln>
+            <a:headEnd type="arrow"/>
+            <a:tailEnd type="arrow"/>
+          </a:ln>
+        </p:spPr>
+        <p:style>
+          <a:lnRef idx="2">
+            <a:schemeClr val="accent1"/>
+          </a:lnRef>
+          <a:fillRef idx="0">
+            <a:schemeClr val="accent1"/>
+          </a:fillRef>
+          <a:effectRef idx="1">
+            <a:schemeClr val="accent1"/>
+          </a:effectRef>
+          <a:fontRef idx="minor">
+            <a:schemeClr val="tx1"/>
+          </a:fontRef>
+        </p:style>
+      </p:cxnSp>
+      <p:cxnSp>
+        <p:nvCxnSpPr>
+          <p:cNvPr id="59" name="Connecteur en angle 58"/>
+          <p:cNvCxnSpPr>
+            <a:endCxn id="19" idx="1"/>
+          </p:cNvCxnSpPr>
+          <p:nvPr/>
+        </p:nvCxnSpPr>
+        <p:spPr>
+          <a:xfrm rot="16200000" flipH="1">
+            <a:off x="4689070" y="1671206"/>
+            <a:ext cx="1206166" cy="1107517"/>
+          </a:xfrm>
+          <a:prstGeom prst="bentConnector2">
+            <a:avLst/>
+          </a:prstGeom>
+          <a:ln>
+            <a:headEnd type="arrow"/>
+            <a:tailEnd type="arrow"/>
+          </a:ln>
+        </p:spPr>
+        <p:style>
+          <a:lnRef idx="2">
+            <a:schemeClr val="accent1"/>
+          </a:lnRef>
+          <a:fillRef idx="0">
+            <a:schemeClr val="accent1"/>
+          </a:fillRef>
+          <a:effectRef idx="1">
+            <a:schemeClr val="accent1"/>
+          </a:effectRef>
+          <a:fontRef idx="minor">
+            <a:schemeClr val="tx1"/>
+          </a:fontRef>
+        </p:style>
+      </p:cxnSp>
+      <p:cxnSp>
+        <p:nvCxnSpPr>
+          <p:cNvPr id="61" name="Connecteur droit avec flèche 60"/>
+          <p:cNvCxnSpPr>
+            <a:stCxn id="24" idx="2"/>
+            <a:endCxn id="5" idx="3"/>
+          </p:cNvCxnSpPr>
+          <p:nvPr/>
+        </p:nvCxnSpPr>
+        <p:spPr>
+          <a:xfrm flipH="1">
+            <a:off x="1109430" y="3221930"/>
+            <a:ext cx="687283" cy="582"/>
+          </a:xfrm>
+          <a:prstGeom prst="straightConnector1">
+            <a:avLst/>
+          </a:prstGeom>
+          <a:ln>
+            <a:solidFill>
+              <a:srgbClr val="F6882E"/>
+            </a:solidFill>
+            <a:tailEnd type="arrow"/>
+          </a:ln>
+        </p:spPr>
+        <p:style>
+          <a:lnRef idx="2">
+            <a:schemeClr val="accent6"/>
+          </a:lnRef>
+          <a:fillRef idx="0">
+            <a:schemeClr val="accent6"/>
+          </a:fillRef>
+          <a:effectRef idx="1">
+            <a:schemeClr val="accent6"/>
+          </a:effectRef>
+          <a:fontRef idx="minor">
+            <a:schemeClr val="tx1"/>
+          </a:fontRef>
+        </p:style>
+      </p:cxnSp>
+      <p:grpSp>
+        <p:nvGrpSpPr>
+          <p:cNvPr id="92" name="Groupe 91"/>
+          <p:cNvGrpSpPr/>
+          <p:nvPr/>
+        </p:nvGrpSpPr>
+        <p:grpSpPr>
+          <a:xfrm>
+            <a:off x="1453070" y="652536"/>
+            <a:ext cx="5516459" cy="5944816"/>
+            <a:chOff x="1287790" y="2420888"/>
+            <a:chExt cx="5732482" cy="3869682"/>
+          </a:xfrm>
+        </p:grpSpPr>
+        <p:sp>
+          <p:nvSpPr>
+            <p:cNvPr id="87" name="Rectangle 86"/>
+            <p:cNvSpPr/>
+            <p:nvPr/>
+          </p:nvSpPr>
+          <p:spPr>
+            <a:xfrm>
+              <a:off x="1287790" y="2424471"/>
+              <a:ext cx="5732482" cy="3866099"/>
+            </a:xfrm>
+            <a:prstGeom prst="rect">
+              <a:avLst/>
+            </a:prstGeom>
+            <a:noFill/>
+            <a:ln>
+              <a:solidFill>
+                <a:schemeClr val="tx1">
+                  <a:alpha val="48000"/>
+                </a:schemeClr>
+              </a:solidFill>
+            </a:ln>
+          </p:spPr>
+          <p:style>
+            <a:lnRef idx="2">
+              <a:schemeClr val="accent1">
+                <a:shade val="50000"/>
+              </a:schemeClr>
+            </a:lnRef>
+            <a:fillRef idx="1">
+              <a:schemeClr val="accent1"/>
+            </a:fillRef>
+            <a:effectRef idx="0">
+              <a:schemeClr val="accent1"/>
+            </a:effectRef>
+            <a:fontRef idx="minor">
+              <a:schemeClr val="lt1"/>
+            </a:fontRef>
+          </p:style>
+          <p:txBody>
+            <a:bodyPr rtlCol="0" anchor="ctr"/>
+            <a:lstStyle/>
+            <a:p>
+              <a:pPr algn="ctr"/>
+              <a:endParaRPr lang="fr-FR" dirty="0"/>
+            </a:p>
+          </p:txBody>
+        </p:sp>
+        <p:grpSp>
+          <p:nvGrpSpPr>
+            <p:cNvPr id="91" name="Groupe 90"/>
+            <p:cNvGrpSpPr/>
+            <p:nvPr/>
+          </p:nvGrpSpPr>
+          <p:grpSpPr>
+            <a:xfrm>
+              <a:off x="3012852" y="2420888"/>
+              <a:ext cx="2104102" cy="356457"/>
+              <a:chOff x="3597794" y="1140081"/>
+              <a:chExt cx="2104102" cy="356457"/>
+            </a:xfrm>
+          </p:grpSpPr>
+          <p:sp>
+            <p:nvSpPr>
+              <p:cNvPr id="88" name="Rectangle à coins arrondis 87"/>
+              <p:cNvSpPr/>
+              <p:nvPr/>
+            </p:nvSpPr>
+            <p:spPr>
+              <a:xfrm>
+                <a:off x="3597794" y="1140081"/>
+                <a:ext cx="2104102" cy="356457"/>
+              </a:xfrm>
+              <a:prstGeom prst="roundRect">
+                <a:avLst/>
+              </a:prstGeom>
+              <a:noFill/>
+              <a:ln>
+                <a:solidFill>
+                  <a:schemeClr val="tx1">
+                    <a:alpha val="50000"/>
+                  </a:schemeClr>
+                </a:solidFill>
+              </a:ln>
+            </p:spPr>
+            <p:style>
+              <a:lnRef idx="2">
+                <a:schemeClr val="accent1">
+                  <a:shade val="50000"/>
+                </a:schemeClr>
+              </a:lnRef>
+              <a:fillRef idx="1">
+                <a:schemeClr val="accent1"/>
+              </a:fillRef>
+              <a:effectRef idx="0">
+                <a:schemeClr val="accent1"/>
+              </a:effectRef>
+              <a:fontRef idx="minor">
+                <a:schemeClr val="lt1"/>
+              </a:fontRef>
+            </p:style>
+            <p:txBody>
+              <a:bodyPr rtlCol="0" anchor="ctr"/>
+              <a:lstStyle/>
+              <a:p>
+                <a:pPr algn="ctr"/>
+                <a:endParaRPr lang="fr-FR"/>
+              </a:p>
+            </p:txBody>
+          </p:sp>
+          <p:sp>
+            <p:nvSpPr>
+              <p:cNvPr id="90" name="ZoneTexte 89"/>
+              <p:cNvSpPr txBox="1"/>
+              <p:nvPr/>
+            </p:nvSpPr>
+            <p:spPr>
+              <a:xfrm>
+                <a:off x="3597794" y="1157984"/>
+                <a:ext cx="2104102" cy="338554"/>
+              </a:xfrm>
+              <a:prstGeom prst="rect">
+                <a:avLst/>
+              </a:prstGeom>
+              <a:noFill/>
+            </p:spPr>
+            <p:txBody>
+              <a:bodyPr wrap="none" rtlCol="0">
+                <a:spAutoFit/>
+              </a:bodyPr>
+              <a:lstStyle/>
+              <a:p>
+                <a:r>
+                  <a:rPr lang="fr-FR" sz="1600" dirty="0" err="1" smtClean="0"/>
+                  <a:t>ShapeDetectionSystem</a:t>
+                </a:r>
+                <a:endParaRPr lang="fr-FR" sz="1600" dirty="0"/>
+              </a:p>
+            </p:txBody>
+          </p:sp>
+        </p:grpSp>
+      </p:grpSp>
+      <p:grpSp>
+        <p:nvGrpSpPr>
+          <p:cNvPr id="50" name="Groupe 49"/>
+          <p:cNvGrpSpPr/>
+          <p:nvPr/>
+        </p:nvGrpSpPr>
+        <p:grpSpPr>
+          <a:xfrm>
+            <a:off x="5845912" y="3678410"/>
+            <a:ext cx="1102352" cy="1406774"/>
+            <a:chOff x="777888" y="2175534"/>
+            <a:chExt cx="1102352" cy="1406774"/>
+          </a:xfrm>
+        </p:grpSpPr>
+        <p:pic>
+          <p:nvPicPr>
+            <p:cNvPr id="51" name="Image 50"/>
+            <p:cNvPicPr>
+              <a:picLocks noChangeAspect="1"/>
+            </p:cNvPicPr>
+            <p:nvPr/>
+          </p:nvPicPr>
+          <p:blipFill>
+            <a:blip r:embed="rId3">
+              <a:extLst>
+                <a:ext uri="{28A0092B-C50C-407E-A947-70E740481C1C}">
+                  <a14:useLocalDpi xmlns:a14="http://schemas.microsoft.com/office/drawing/2010/main" val="0"/>
+                </a:ext>
+              </a:extLst>
+            </a:blip>
+            <a:stretch>
+              <a:fillRect/>
+            </a:stretch>
+          </p:blipFill>
+          <p:spPr>
+            <a:xfrm>
+              <a:off x="777888" y="2175534"/>
+              <a:ext cx="1102352" cy="1102352"/>
+            </a:xfrm>
+            <a:prstGeom prst="rect">
+              <a:avLst/>
+            </a:prstGeom>
+          </p:spPr>
+        </p:pic>
+        <p:sp>
+          <p:nvSpPr>
+            <p:cNvPr id="53" name="ZoneTexte 52"/>
+            <p:cNvSpPr txBox="1"/>
+            <p:nvPr/>
+          </p:nvSpPr>
+          <p:spPr>
+            <a:xfrm>
+              <a:off x="1001089" y="3212976"/>
+              <a:ext cx="655949" cy="369332"/>
+            </a:xfrm>
+            <a:prstGeom prst="rect">
+              <a:avLst/>
+            </a:prstGeom>
+            <a:noFill/>
+          </p:spPr>
+          <p:txBody>
+            <a:bodyPr wrap="none" rtlCol="0">
+              <a:spAutoFit/>
+            </a:bodyPr>
+            <a:lstStyle/>
+            <a:p>
+              <a:r>
+                <a:rPr lang="fr-FR" b="1" dirty="0" smtClean="0"/>
+                <a:t>RAM</a:t>
+              </a:r>
+              <a:endParaRPr lang="fr-FR" b="1" dirty="0"/>
+            </a:p>
+          </p:txBody>
+        </p:sp>
+      </p:grpSp>
+      <p:cxnSp>
+        <p:nvCxnSpPr>
+          <p:cNvPr id="54" name="Connecteur en angle 53"/>
+          <p:cNvCxnSpPr>
+            <a:endCxn id="51" idx="1"/>
+          </p:cNvCxnSpPr>
+          <p:nvPr/>
+        </p:nvCxnSpPr>
+        <p:spPr>
+          <a:xfrm rot="16200000" flipH="1">
+            <a:off x="3869101" y="2252775"/>
+            <a:ext cx="2607704" cy="1345918"/>
+          </a:xfrm>
+          <a:prstGeom prst="bentConnector2">
+            <a:avLst/>
+          </a:prstGeom>
+          <a:ln>
+            <a:headEnd type="arrow"/>
+            <a:tailEnd type="arrow"/>
+          </a:ln>
+        </p:spPr>
+        <p:style>
+          <a:lnRef idx="2">
+            <a:schemeClr val="accent1"/>
+          </a:lnRef>
+          <a:fillRef idx="0">
+            <a:schemeClr val="accent1"/>
+          </a:fillRef>
+          <a:effectRef idx="1">
+            <a:schemeClr val="accent1"/>
+          </a:effectRef>
+          <a:fontRef idx="minor">
+            <a:schemeClr val="tx1"/>
+          </a:fontRef>
+        </p:style>
+      </p:cxnSp>
+      <p:grpSp>
+        <p:nvGrpSpPr>
+          <p:cNvPr id="56" name="Groupe 55"/>
+          <p:cNvGrpSpPr/>
+          <p:nvPr/>
+        </p:nvGrpSpPr>
+        <p:grpSpPr>
+          <a:xfrm>
+            <a:off x="5850624" y="5190578"/>
+            <a:ext cx="1102352" cy="1406774"/>
+            <a:chOff x="777888" y="2175534"/>
+            <a:chExt cx="1102352" cy="1406774"/>
+          </a:xfrm>
+        </p:grpSpPr>
+        <p:pic>
+          <p:nvPicPr>
+            <p:cNvPr id="57" name="Image 56"/>
+            <p:cNvPicPr>
+              <a:picLocks noChangeAspect="1"/>
+            </p:cNvPicPr>
+            <p:nvPr/>
+          </p:nvPicPr>
+          <p:blipFill>
+            <a:blip r:embed="rId3">
+              <a:extLst>
+                <a:ext uri="{28A0092B-C50C-407E-A947-70E740481C1C}">
+                  <a14:useLocalDpi xmlns:a14="http://schemas.microsoft.com/office/drawing/2010/main" val="0"/>
+                </a:ext>
+              </a:extLst>
+            </a:blip>
+            <a:stretch>
+              <a:fillRect/>
+            </a:stretch>
+          </p:blipFill>
+          <p:spPr>
+            <a:xfrm>
+              <a:off x="777888" y="2175534"/>
+              <a:ext cx="1102352" cy="1102352"/>
+            </a:xfrm>
+            <a:prstGeom prst="rect">
+              <a:avLst/>
+            </a:prstGeom>
+          </p:spPr>
+        </p:pic>
+        <p:sp>
+          <p:nvSpPr>
+            <p:cNvPr id="58" name="ZoneTexte 57"/>
+            <p:cNvSpPr txBox="1"/>
+            <p:nvPr/>
+          </p:nvSpPr>
+          <p:spPr>
+            <a:xfrm>
+              <a:off x="996377" y="3212976"/>
+              <a:ext cx="606256" cy="369332"/>
+            </a:xfrm>
+            <a:prstGeom prst="rect">
+              <a:avLst/>
+            </a:prstGeom>
+            <a:noFill/>
+          </p:spPr>
+          <p:txBody>
+            <a:bodyPr wrap="none" rtlCol="0">
+              <a:spAutoFit/>
+            </a:bodyPr>
+            <a:lstStyle/>
+            <a:p>
+              <a:r>
+                <a:rPr lang="fr-FR" b="1" dirty="0" smtClean="0"/>
+                <a:t>GPU</a:t>
+              </a:r>
+              <a:endParaRPr lang="fr-FR" b="1" dirty="0"/>
+            </a:p>
+          </p:txBody>
+        </p:sp>
+      </p:grpSp>
+      <p:cxnSp>
+        <p:nvCxnSpPr>
+          <p:cNvPr id="60" name="Connecteur en angle 59"/>
+          <p:cNvCxnSpPr>
+            <a:endCxn id="57" idx="1"/>
+          </p:cNvCxnSpPr>
+          <p:nvPr/>
+        </p:nvCxnSpPr>
+        <p:spPr>
+          <a:xfrm rot="16200000" flipH="1">
+            <a:off x="2959511" y="2850640"/>
+            <a:ext cx="4119873" cy="1662353"/>
+          </a:xfrm>
+          <a:prstGeom prst="bentConnector2">
+            <a:avLst/>
+          </a:prstGeom>
+          <a:ln>
+            <a:headEnd type="arrow"/>
+            <a:tailEnd type="arrow"/>
+          </a:ln>
+        </p:spPr>
+        <p:style>
+          <a:lnRef idx="2">
+            <a:schemeClr val="accent1"/>
+          </a:lnRef>
+          <a:fillRef idx="0">
+            <a:schemeClr val="accent1"/>
+          </a:fillRef>
+          <a:effectRef idx="1">
+            <a:schemeClr val="accent1"/>
+          </a:effectRef>
+          <a:fontRef idx="minor">
+            <a:schemeClr val="tx1"/>
+          </a:fontRef>
+        </p:style>
+      </p:cxnSp>
+    </p:spTree>
+    <p:extLst>
+      <p:ext uri="{BB962C8B-B14F-4D97-AF65-F5344CB8AC3E}">
+        <p14:creationId xmlns:p14="http://schemas.microsoft.com/office/powerpoint/2010/main" val="3337650464"/>
+      </p:ext>
+    </p:extLst>
+  </p:cSld>
+  <p:clrMapOvr>
+    <a:masterClrMapping/>
+  </p:clrMapOvr>
+  <p:timing>
+    <p:tnLst>
+      <p:par>
+        <p:cTn id="1" dur="indefinite" restart="never" nodeType="tmRoot"/>
+      </p:par>
+    </p:tnLst>
+  </p:timing>
+</p:sld>
+</file>
+
+<file path=ppt/slides/slide5.xml><?xml version="1.0" encoding="utf-8"?>
 <p:sld xmlns:a="http://schemas.openxmlformats.org/drawingml/2006/main" xmlns:r="http://schemas.openxmlformats.org/officeDocument/2006/relationships" xmlns:p="http://schemas.openxmlformats.org/presentationml/2006/main">
   <p:cSld>
     <p:spTree>
@@ -6893,7 +9073,7 @@
 </p:sld>
 </file>
 
-<file path=ppt/slides/slide4.xml><?xml version="1.0" encoding="utf-8"?>
+<file path=ppt/slides/slide6.xml><?xml version="1.0" encoding="utf-8"?>
 <p:sld xmlns:a="http://schemas.openxmlformats.org/drawingml/2006/main" xmlns:r="http://schemas.openxmlformats.org/officeDocument/2006/relationships" xmlns:p="http://schemas.openxmlformats.org/presentationml/2006/main">
   <p:cSld>
     <p:spTree>
@@ -8039,7 +10219,7 @@
 </p:sld>
 </file>
 
-<file path=ppt/slides/slide5.xml><?xml version="1.0" encoding="utf-8"?>
+<file path=ppt/slides/slide7.xml><?xml version="1.0" encoding="utf-8"?>
 <p:sld xmlns:a="http://schemas.openxmlformats.org/drawingml/2006/main" xmlns:r="http://schemas.openxmlformats.org/officeDocument/2006/relationships" xmlns:p="http://schemas.openxmlformats.org/presentationml/2006/main">
   <p:cSld>
     <p:spTree>
@@ -9185,7 +11365,7 @@
 </p:sld>
 </file>
 
-<file path=ppt/slides/slide6.xml><?xml version="1.0" encoding="utf-8"?>
+<file path=ppt/slides/slide8.xml><?xml version="1.0" encoding="utf-8"?>
 <p:sld xmlns:a="http://schemas.openxmlformats.org/drawingml/2006/main" xmlns:r="http://schemas.openxmlformats.org/officeDocument/2006/relationships" xmlns:p="http://schemas.openxmlformats.org/presentationml/2006/main">
   <p:cSld>
     <p:spTree>
@@ -10331,7 +12511,7 @@
 </p:sld>
 </file>
 
-<file path=ppt/slides/slide7.xml><?xml version="1.0" encoding="utf-8"?>
+<file path=ppt/slides/slide9.xml><?xml version="1.0" encoding="utf-8"?>
 <p:sld xmlns:a="http://schemas.openxmlformats.org/drawingml/2006/main" xmlns:r="http://schemas.openxmlformats.org/officeDocument/2006/relationships" xmlns:p="http://schemas.openxmlformats.org/presentationml/2006/main">
   <p:cSld>
     <p:spTree>
@@ -10849,544 +13029,6 @@
     <p:extLst>
       <p:ext uri="{BB962C8B-B14F-4D97-AF65-F5344CB8AC3E}">
         <p14:creationId xmlns:p14="http://schemas.microsoft.com/office/powerpoint/2010/main" val="2724669242"/>
-      </p:ext>
-    </p:extLst>
-  </p:cSld>
-  <p:clrMapOvr>
-    <a:masterClrMapping/>
-  </p:clrMapOvr>
-  <p:timing>
-    <p:tnLst>
-      <p:par>
-        <p:cTn id="1" dur="indefinite" restart="never" nodeType="tmRoot"/>
-      </p:par>
-    </p:tnLst>
-  </p:timing>
-</p:sld>
-</file>
-
-<file path=ppt/slides/slide8.xml><?xml version="1.0" encoding="utf-8"?>
-<p:sld xmlns:a="http://schemas.openxmlformats.org/drawingml/2006/main" xmlns:r="http://schemas.openxmlformats.org/officeDocument/2006/relationships" xmlns:p="http://schemas.openxmlformats.org/presentationml/2006/main">
-  <p:cSld>
-    <p:spTree>
-      <p:nvGrpSpPr>
-        <p:cNvPr id="1" name=""/>
-        <p:cNvGrpSpPr/>
-        <p:nvPr/>
-      </p:nvGrpSpPr>
-      <p:grpSpPr>
-        <a:xfrm>
-          <a:off x="0" y="0"/>
-          <a:ext cx="0" cy="0"/>
-          <a:chOff x="0" y="0"/>
-          <a:chExt cx="0" cy="0"/>
-        </a:xfrm>
-      </p:grpSpPr>
-      <p:grpSp>
-        <p:nvGrpSpPr>
-          <p:cNvPr id="8" name="Groupe 7"/>
-          <p:cNvGrpSpPr/>
-          <p:nvPr/>
-        </p:nvGrpSpPr>
-        <p:grpSpPr>
-          <a:xfrm>
-            <a:off x="245907" y="146826"/>
-            <a:ext cx="3528392" cy="1440160"/>
-            <a:chOff x="539552" y="260648"/>
-            <a:chExt cx="3528392" cy="1440160"/>
-          </a:xfrm>
-        </p:grpSpPr>
-        <p:sp>
-          <p:nvSpPr>
-            <p:cNvPr id="7" name="Rectangle 6"/>
-            <p:cNvSpPr/>
-            <p:nvPr/>
-          </p:nvSpPr>
-          <p:spPr>
-            <a:xfrm>
-              <a:off x="539552" y="260648"/>
-              <a:ext cx="3528392" cy="1440160"/>
-            </a:xfrm>
-            <a:prstGeom prst="rect">
-              <a:avLst/>
-            </a:prstGeom>
-          </p:spPr>
-          <p:style>
-            <a:lnRef idx="2">
-              <a:schemeClr val="accent1">
-                <a:shade val="50000"/>
-              </a:schemeClr>
-            </a:lnRef>
-            <a:fillRef idx="1">
-              <a:schemeClr val="accent1"/>
-            </a:fillRef>
-            <a:effectRef idx="0">
-              <a:schemeClr val="accent1"/>
-            </a:effectRef>
-            <a:fontRef idx="minor">
-              <a:schemeClr val="lt1"/>
-            </a:fontRef>
-          </p:style>
-          <p:txBody>
-            <a:bodyPr rtlCol="0" anchor="t" anchorCtr="0"/>
-            <a:lstStyle/>
-            <a:p>
-              <a:r>
-                <a:rPr lang="fr-FR" b="1" dirty="0" err="1" smtClean="0"/>
-                <a:t>Pimca</a:t>
-              </a:r>
-              <a:endParaRPr lang="fr-FR" b="1" dirty="0"/>
-            </a:p>
-          </p:txBody>
-        </p:sp>
-        <p:sp>
-          <p:nvSpPr>
-            <p:cNvPr id="2" name="ZoneTexte 1"/>
-            <p:cNvSpPr txBox="1"/>
-            <p:nvPr/>
-          </p:nvSpPr>
-          <p:spPr>
-            <a:xfrm>
-              <a:off x="821971" y="717466"/>
-              <a:ext cx="3096344" cy="369332"/>
-            </a:xfrm>
-            <a:prstGeom prst="rect">
-              <a:avLst/>
-            </a:prstGeom>
-            <a:noFill/>
-          </p:spPr>
-          <p:txBody>
-            <a:bodyPr wrap="square" rtlCol="0">
-              <a:spAutoFit/>
-            </a:bodyPr>
-            <a:lstStyle/>
-            <a:p>
-              <a:r>
-                <a:rPr lang="fr-FR" dirty="0" smtClean="0"/>
-                <a:t>Modèle2 du système supposé</a:t>
-              </a:r>
-              <a:endParaRPr lang="fr-FR" dirty="0"/>
-            </a:p>
-          </p:txBody>
-        </p:sp>
-      </p:grpSp>
-      <p:grpSp>
-        <p:nvGrpSpPr>
-          <p:cNvPr id="9" name="Groupe 8"/>
-          <p:cNvGrpSpPr/>
-          <p:nvPr/>
-        </p:nvGrpSpPr>
-        <p:grpSpPr>
-          <a:xfrm>
-            <a:off x="4986265" y="146826"/>
-            <a:ext cx="3992251" cy="1440160"/>
-            <a:chOff x="4842250" y="260648"/>
-            <a:chExt cx="3992251" cy="1440160"/>
-          </a:xfrm>
-        </p:grpSpPr>
-        <p:sp>
-          <p:nvSpPr>
-            <p:cNvPr id="40" name="Rectangle 39"/>
-            <p:cNvSpPr/>
-            <p:nvPr/>
-          </p:nvSpPr>
-          <p:spPr>
-            <a:xfrm>
-              <a:off x="4842250" y="260648"/>
-              <a:ext cx="3992251" cy="1440160"/>
-            </a:xfrm>
-            <a:prstGeom prst="rect">
-              <a:avLst/>
-            </a:prstGeom>
-          </p:spPr>
-          <p:style>
-            <a:lnRef idx="2">
-              <a:schemeClr val="accent1">
-                <a:shade val="50000"/>
-              </a:schemeClr>
-            </a:lnRef>
-            <a:fillRef idx="1">
-              <a:schemeClr val="accent1"/>
-            </a:fillRef>
-            <a:effectRef idx="0">
-              <a:schemeClr val="accent1"/>
-            </a:effectRef>
-            <a:fontRef idx="minor">
-              <a:schemeClr val="lt1"/>
-            </a:fontRef>
-          </p:style>
-          <p:txBody>
-            <a:bodyPr rtlCol="0" anchor="t" anchorCtr="0"/>
-            <a:lstStyle/>
-            <a:p>
-              <a:r>
-                <a:rPr lang="fr-FR" b="1" dirty="0" smtClean="0"/>
-                <a:t>Excel</a:t>
-              </a:r>
-              <a:endParaRPr lang="fr-FR" b="1" dirty="0"/>
-            </a:p>
-          </p:txBody>
-        </p:sp>
-        <p:sp>
-          <p:nvSpPr>
-            <p:cNvPr id="3" name="ZoneTexte 2"/>
-            <p:cNvSpPr txBox="1"/>
-            <p:nvPr/>
-          </p:nvSpPr>
-          <p:spPr>
-            <a:xfrm>
-              <a:off x="4986265" y="683404"/>
-              <a:ext cx="3704219" cy="369332"/>
-            </a:xfrm>
-            <a:prstGeom prst="rect">
-              <a:avLst/>
-            </a:prstGeom>
-            <a:noFill/>
-          </p:spPr>
-          <p:txBody>
-            <a:bodyPr wrap="none" rtlCol="0">
-              <a:spAutoFit/>
-            </a:bodyPr>
-            <a:lstStyle/>
-            <a:p>
-              <a:r>
-                <a:rPr lang="fr-FR" dirty="0" smtClean="0"/>
-                <a:t>Consommation du système = 10kW/h</a:t>
-              </a:r>
-              <a:endParaRPr lang="fr-FR" dirty="0"/>
-            </a:p>
-          </p:txBody>
-        </p:sp>
-      </p:grpSp>
-      <p:sp>
-        <p:nvSpPr>
-          <p:cNvPr id="10" name="Ellipse 9"/>
-          <p:cNvSpPr/>
-          <p:nvPr/>
-        </p:nvSpPr>
-        <p:spPr>
-          <a:xfrm>
-            <a:off x="2699792" y="2132856"/>
-            <a:ext cx="3397763" cy="1853722"/>
-          </a:xfrm>
-          <a:prstGeom prst="ellipse">
-            <a:avLst/>
-          </a:prstGeom>
-        </p:spPr>
-        <p:style>
-          <a:lnRef idx="2">
-            <a:schemeClr val="accent3">
-              <a:shade val="50000"/>
-            </a:schemeClr>
-          </a:lnRef>
-          <a:fillRef idx="1">
-            <a:schemeClr val="accent3"/>
-          </a:fillRef>
-          <a:effectRef idx="0">
-            <a:schemeClr val="accent3"/>
-          </a:effectRef>
-          <a:fontRef idx="minor">
-            <a:schemeClr val="lt1"/>
-          </a:fontRef>
-        </p:style>
-        <p:txBody>
-          <a:bodyPr rtlCol="0" anchor="ctr" anchorCtr="0"/>
-          <a:lstStyle/>
-          <a:p>
-            <a:pPr algn="ctr"/>
-            <a:r>
-              <a:rPr lang="fr-FR" b="1" dirty="0" smtClean="0"/>
-              <a:t>Role4All</a:t>
-            </a:r>
-            <a:endParaRPr lang="fr-FR" b="1" dirty="0"/>
-          </a:p>
-        </p:txBody>
-      </p:sp>
-      <p:cxnSp>
-        <p:nvCxnSpPr>
-          <p:cNvPr id="15" name="Connecteur droit avec flèche 14"/>
-          <p:cNvCxnSpPr>
-            <a:stCxn id="40" idx="2"/>
-            <a:endCxn id="10" idx="7"/>
-          </p:cNvCxnSpPr>
-          <p:nvPr/>
-        </p:nvCxnSpPr>
-        <p:spPr>
-          <a:xfrm flipH="1">
-            <a:off x="5599964" y="1586986"/>
-            <a:ext cx="1382427" cy="817341"/>
-          </a:xfrm>
-          <a:prstGeom prst="straightConnector1">
-            <a:avLst/>
-          </a:prstGeom>
-          <a:ln>
-            <a:tailEnd type="arrow"/>
-          </a:ln>
-        </p:spPr>
-        <p:style>
-          <a:lnRef idx="2">
-            <a:schemeClr val="accent1"/>
-          </a:lnRef>
-          <a:fillRef idx="0">
-            <a:schemeClr val="accent1"/>
-          </a:fillRef>
-          <a:effectRef idx="1">
-            <a:schemeClr val="accent1"/>
-          </a:effectRef>
-          <a:fontRef idx="minor">
-            <a:schemeClr val="tx1"/>
-          </a:fontRef>
-        </p:style>
-      </p:cxnSp>
-      <p:cxnSp>
-        <p:nvCxnSpPr>
-          <p:cNvPr id="27" name="Connecteur droit avec flèche 26"/>
-          <p:cNvCxnSpPr>
-            <a:stCxn id="7" idx="2"/>
-            <a:endCxn id="10" idx="1"/>
-          </p:cNvCxnSpPr>
-          <p:nvPr/>
-        </p:nvCxnSpPr>
-        <p:spPr>
-          <a:xfrm>
-            <a:off x="2010103" y="1586986"/>
-            <a:ext cx="1187280" cy="817341"/>
-          </a:xfrm>
-          <a:prstGeom prst="straightConnector1">
-            <a:avLst/>
-          </a:prstGeom>
-          <a:ln>
-            <a:tailEnd type="arrow"/>
-          </a:ln>
-        </p:spPr>
-        <p:style>
-          <a:lnRef idx="2">
-            <a:schemeClr val="accent1"/>
-          </a:lnRef>
-          <a:fillRef idx="0">
-            <a:schemeClr val="accent1"/>
-          </a:fillRef>
-          <a:effectRef idx="1">
-            <a:schemeClr val="accent1"/>
-          </a:effectRef>
-          <a:fontRef idx="minor">
-            <a:schemeClr val="tx1"/>
-          </a:fontRef>
-        </p:style>
-      </p:cxnSp>
-      <p:sp>
-        <p:nvSpPr>
-          <p:cNvPr id="33" name="Rectangle à coins arrondis 32"/>
-          <p:cNvSpPr/>
-          <p:nvPr/>
-        </p:nvSpPr>
-        <p:spPr>
-          <a:xfrm>
-            <a:off x="74958" y="4581128"/>
-            <a:ext cx="3168352" cy="1728192"/>
-          </a:xfrm>
-          <a:prstGeom prst="roundRect">
-            <a:avLst/>
-          </a:prstGeom>
-        </p:spPr>
-        <p:style>
-          <a:lnRef idx="2">
-            <a:schemeClr val="accent2">
-              <a:shade val="50000"/>
-            </a:schemeClr>
-          </a:lnRef>
-          <a:fillRef idx="1">
-            <a:schemeClr val="accent2"/>
-          </a:fillRef>
-          <a:effectRef idx="0">
-            <a:schemeClr val="accent2"/>
-          </a:effectRef>
-          <a:fontRef idx="minor">
-            <a:schemeClr val="lt1"/>
-          </a:fontRef>
-        </p:style>
-        <p:txBody>
-          <a:bodyPr rtlCol="0" anchor="t" anchorCtr="0"/>
-          <a:lstStyle/>
-          <a:p>
-            <a:r>
-              <a:rPr lang="fr-FR" b="1" dirty="0" err="1" smtClean="0"/>
-              <a:t>Morphose</a:t>
-            </a:r>
-            <a:endParaRPr lang="fr-FR" b="1" dirty="0"/>
-          </a:p>
-        </p:txBody>
-      </p:sp>
-      <p:cxnSp>
-        <p:nvCxnSpPr>
-          <p:cNvPr id="37" name="Connecteur droit avec flèche 36"/>
-          <p:cNvCxnSpPr>
-            <a:stCxn id="10" idx="4"/>
-            <a:endCxn id="33" idx="0"/>
-          </p:cNvCxnSpPr>
-          <p:nvPr/>
-        </p:nvCxnSpPr>
-        <p:spPr>
-          <a:xfrm flipH="1">
-            <a:off x="1659134" y="3986578"/>
-            <a:ext cx="2739540" cy="594550"/>
-          </a:xfrm>
-          <a:prstGeom prst="straightConnector1">
-            <a:avLst/>
-          </a:prstGeom>
-          <a:ln>
-            <a:tailEnd type="arrow"/>
-          </a:ln>
-        </p:spPr>
-        <p:style>
-          <a:lnRef idx="3">
-            <a:schemeClr val="accent3"/>
-          </a:lnRef>
-          <a:fillRef idx="0">
-            <a:schemeClr val="accent3"/>
-          </a:fillRef>
-          <a:effectRef idx="2">
-            <a:schemeClr val="accent3"/>
-          </a:effectRef>
-          <a:fontRef idx="minor">
-            <a:schemeClr val="tx1"/>
-          </a:fontRef>
-        </p:style>
-      </p:cxnSp>
-      <p:sp>
-        <p:nvSpPr>
-          <p:cNvPr id="67" name="ZoneTexte 66"/>
-          <p:cNvSpPr txBox="1"/>
-          <p:nvPr/>
-        </p:nvSpPr>
-        <p:spPr>
-          <a:xfrm>
-            <a:off x="171451" y="5301208"/>
-            <a:ext cx="2975366" cy="646331"/>
-          </a:xfrm>
-          <a:prstGeom prst="rect">
-            <a:avLst/>
-          </a:prstGeom>
-          <a:noFill/>
-        </p:spPr>
-        <p:txBody>
-          <a:bodyPr wrap="none" rtlCol="0">
-            <a:spAutoFit/>
-          </a:bodyPr>
-          <a:lstStyle/>
-          <a:p>
-            <a:pPr algn="ctr"/>
-            <a:r>
-              <a:rPr lang="fr-FR" dirty="0" smtClean="0"/>
-              <a:t>Modèle2 du système supposé</a:t>
-            </a:r>
-          </a:p>
-          <a:p>
-            <a:pPr algn="ctr"/>
-            <a:r>
-              <a:rPr lang="fr-FR" dirty="0" smtClean="0"/>
-              <a:t> consommant 10kW/h</a:t>
-            </a:r>
-            <a:endParaRPr lang="fr-FR" dirty="0"/>
-          </a:p>
-        </p:txBody>
-      </p:sp>
-      <p:cxnSp>
-        <p:nvCxnSpPr>
-          <p:cNvPr id="57" name="Connecteur droit avec flèche 56"/>
-          <p:cNvCxnSpPr>
-            <a:stCxn id="33" idx="3"/>
-          </p:cNvCxnSpPr>
-          <p:nvPr/>
-        </p:nvCxnSpPr>
-        <p:spPr>
-          <a:xfrm>
-            <a:off x="3243310" y="5445224"/>
-            <a:ext cx="752626" cy="0"/>
-          </a:xfrm>
-          <a:prstGeom prst="straightConnector1">
-            <a:avLst/>
-          </a:prstGeom>
-          <a:ln>
-            <a:tailEnd type="arrow"/>
-          </a:ln>
-        </p:spPr>
-        <p:style>
-          <a:lnRef idx="3">
-            <a:schemeClr val="dk1"/>
-          </a:lnRef>
-          <a:fillRef idx="0">
-            <a:schemeClr val="dk1"/>
-          </a:fillRef>
-          <a:effectRef idx="2">
-            <a:schemeClr val="dk1"/>
-          </a:effectRef>
-          <a:fontRef idx="minor">
-            <a:schemeClr val="tx1"/>
-          </a:fontRef>
-        </p:style>
-      </p:cxnSp>
-      <p:sp>
-        <p:nvSpPr>
-          <p:cNvPr id="58" name="ZoneTexte 57"/>
-          <p:cNvSpPr txBox="1"/>
-          <p:nvPr/>
-        </p:nvSpPr>
-        <p:spPr>
-          <a:xfrm>
-            <a:off x="4198175" y="4978042"/>
-            <a:ext cx="4539383" cy="923330"/>
-          </a:xfrm>
-          <a:prstGeom prst="rect">
-            <a:avLst/>
-          </a:prstGeom>
-          <a:noFill/>
-        </p:spPr>
-        <p:txBody>
-          <a:bodyPr wrap="none" rtlCol="0">
-            <a:spAutoFit/>
-          </a:bodyPr>
-          <a:lstStyle/>
-          <a:p>
-            <a:pPr algn="ctr"/>
-            <a:r>
-              <a:rPr lang="fr-FR" b="1" dirty="0" err="1" smtClean="0"/>
-              <a:t>Succés</a:t>
-            </a:r>
-            <a:r>
-              <a:rPr lang="fr-FR" b="1" dirty="0" smtClean="0"/>
-              <a:t>:</a:t>
-            </a:r>
-            <a:r>
-              <a:rPr lang="fr-FR" dirty="0" smtClean="0"/>
-              <a:t> </a:t>
-            </a:r>
-          </a:p>
-          <a:p>
-            <a:pPr algn="ctr"/>
-            <a:r>
-              <a:rPr lang="fr-FR" dirty="0"/>
-              <a:t>C</a:t>
-            </a:r>
-            <a:r>
-              <a:rPr lang="fr-FR" dirty="0" smtClean="0"/>
-              <a:t>onsommation du système supposé = 10kW/h</a:t>
-            </a:r>
-          </a:p>
-          <a:p>
-            <a:pPr algn="ctr"/>
-            <a:r>
-              <a:rPr lang="fr-FR" dirty="0" smtClean="0"/>
-              <a:t>Consommation du système réel = 10kW/h</a:t>
-            </a:r>
-            <a:endParaRPr lang="fr-FR" dirty="0"/>
-          </a:p>
-        </p:txBody>
-      </p:sp>
-    </p:spTree>
-    <p:extLst>
-      <p:ext uri="{BB962C8B-B14F-4D97-AF65-F5344CB8AC3E}">
-        <p14:creationId xmlns:p14="http://schemas.microsoft.com/office/powerpoint/2010/main" val="1645594382"/>
       </p:ext>
     </p:extLst>
   </p:cSld>

</xml_diff>